<commit_message>
State in class component
1. How to initialize and render in class component?
class xxx extends Component {
   constructor () {
      super()
      this.state = {
         message: 'Peter'
     }
   } 
  redner() {
     return  () {
        <div>
            <p> { this.state.message} </p>
        </div>
     }
  }
}
</commit_message>
<xml_diff>
--- a/10_State.pptx
+++ b/10_State.pptx
@@ -5,7 +5,7 @@
     <p:sldMasterId id="2147483648" r:id="rId1"/>
   </p:sldMasterIdLst>
   <p:notesMasterIdLst>
-    <p:notesMasterId r:id="rId14"/>
+    <p:notesMasterId r:id="rId18"/>
   </p:notesMasterIdLst>
   <p:sldIdLst>
     <p:sldId id="256" r:id="rId2"/>
@@ -19,7 +19,11 @@
     <p:sldId id="270" r:id="rId10"/>
     <p:sldId id="271" r:id="rId11"/>
     <p:sldId id="272" r:id="rId12"/>
-    <p:sldId id="259" r:id="rId13"/>
+    <p:sldId id="273" r:id="rId13"/>
+    <p:sldId id="274" r:id="rId14"/>
+    <p:sldId id="275" r:id="rId15"/>
+    <p:sldId id="276" r:id="rId16"/>
+    <p:sldId id="259" r:id="rId17"/>
   </p:sldIdLst>
   <p:sldSz cx="9144000" cy="6858000" type="screen4x3"/>
   <p:notesSz cx="6858000" cy="9144000"/>
@@ -220,7 +224,7 @@
             <a:fld id="{6837EDA8-41C8-4B24-A206-13C08A65A6D7}" type="datetimeFigureOut">
               <a:rPr lang="zh-TW" altLang="en-US" smtClean="0"/>
               <a:pPr/>
-              <a:t>2020/4/1</a:t>
+              <a:t>2020/6/28</a:t>
             </a:fld>
             <a:endParaRPr lang="zh-TW" altLang="en-US"/>
           </a:p>
@@ -673,7 +677,7 @@
             <a:fld id="{8B85509C-BD4F-47BF-9B1E-FC2E949B3621}" type="datetime1">
               <a:rPr lang="zh-TW" altLang="en-US" smtClean="0"/>
               <a:pPr/>
-              <a:t>2020/4/1</a:t>
+              <a:t>2020/6/28</a:t>
             </a:fld>
             <a:endParaRPr lang="zh-TW" altLang="en-US"/>
           </a:p>
@@ -846,7 +850,7 @@
             <a:fld id="{42251B24-F787-4C15-8A0F-7AEC20C70069}" type="datetime1">
               <a:rPr lang="zh-TW" altLang="en-US" smtClean="0"/>
               <a:pPr/>
-              <a:t>2020/4/1</a:t>
+              <a:t>2020/6/28</a:t>
             </a:fld>
             <a:endParaRPr lang="zh-TW" altLang="en-US"/>
           </a:p>
@@ -1021,7 +1025,7 @@
             <a:fld id="{9CA0D33C-CE2B-45F1-B8D4-FFD1F131F331}" type="datetime1">
               <a:rPr lang="zh-TW" altLang="en-US" smtClean="0"/>
               <a:pPr/>
-              <a:t>2020/4/1</a:t>
+              <a:t>2020/6/28</a:t>
             </a:fld>
             <a:endParaRPr lang="zh-TW" altLang="en-US"/>
           </a:p>
@@ -1186,7 +1190,7 @@
             <a:fld id="{50B99440-D9EF-40CC-9B52-F6428D9B2C76}" type="datetime1">
               <a:rPr lang="zh-TW" altLang="en-US" smtClean="0"/>
               <a:pPr/>
-              <a:t>2020/4/1</a:t>
+              <a:t>2020/6/28</a:t>
             </a:fld>
             <a:endParaRPr lang="zh-TW" altLang="en-US"/>
           </a:p>
@@ -1428,7 +1432,7 @@
             <a:fld id="{0871BF52-5C6C-4959-8E27-CECB68D39FE4}" type="datetime1">
               <a:rPr lang="zh-TW" altLang="en-US" smtClean="0"/>
               <a:pPr/>
-              <a:t>2020/4/1</a:t>
+              <a:t>2020/6/28</a:t>
             </a:fld>
             <a:endParaRPr lang="zh-TW" altLang="en-US"/>
           </a:p>
@@ -1710,7 +1714,7 @@
             <a:fld id="{DF863F05-2DD9-4EB1-A827-12FD992DE9DC}" type="datetime1">
               <a:rPr lang="zh-TW" altLang="en-US" smtClean="0"/>
               <a:pPr/>
-              <a:t>2020/4/1</a:t>
+              <a:t>2020/6/28</a:t>
             </a:fld>
             <a:endParaRPr lang="zh-TW" altLang="en-US"/>
           </a:p>
@@ -2126,7 +2130,7 @@
             <a:fld id="{6339AF51-4491-4873-A096-75DB6CE47516}" type="datetime1">
               <a:rPr lang="zh-TW" altLang="en-US" smtClean="0"/>
               <a:pPr/>
-              <a:t>2020/4/1</a:t>
+              <a:t>2020/6/28</a:t>
             </a:fld>
             <a:endParaRPr lang="zh-TW" altLang="en-US"/>
           </a:p>
@@ -2240,7 +2244,7 @@
             <a:fld id="{EE4AD9C8-8B9E-40FF-ABE2-858AC2057BBB}" type="datetime1">
               <a:rPr lang="zh-TW" altLang="en-US" smtClean="0"/>
               <a:pPr/>
-              <a:t>2020/4/1</a:t>
+              <a:t>2020/6/28</a:t>
             </a:fld>
             <a:endParaRPr lang="zh-TW" altLang="en-US"/>
           </a:p>
@@ -2332,7 +2336,7 @@
             <a:fld id="{B4784999-BBBE-4BE4-A8D0-877E7D1D66CC}" type="datetime1">
               <a:rPr lang="zh-TW" altLang="en-US" smtClean="0"/>
               <a:pPr/>
-              <a:t>2020/4/1</a:t>
+              <a:t>2020/6/28</a:t>
             </a:fld>
             <a:endParaRPr lang="zh-TW" altLang="en-US"/>
           </a:p>
@@ -2604,7 +2608,7 @@
             <a:fld id="{E88D17E6-02BD-4944-B9FE-7BFCCBF83D48}" type="datetime1">
               <a:rPr lang="zh-TW" altLang="en-US" smtClean="0"/>
               <a:pPr/>
-              <a:t>2020/4/1</a:t>
+              <a:t>2020/6/28</a:t>
             </a:fld>
             <a:endParaRPr lang="zh-TW" altLang="en-US"/>
           </a:p>
@@ -2853,7 +2857,7 @@
             <a:fld id="{3C13E23D-1FEF-4D78-A3A3-3D6F2BB31954}" type="datetime1">
               <a:rPr lang="zh-TW" altLang="en-US" smtClean="0"/>
               <a:pPr/>
-              <a:t>2020/4/1</a:t>
+              <a:t>2020/6/28</a:t>
             </a:fld>
             <a:endParaRPr lang="zh-TW" altLang="en-US"/>
           </a:p>
@@ -3061,7 +3065,7 @@
             <a:fld id="{06197F35-AD6F-4594-8B50-334492D2E7E8}" type="datetime1">
               <a:rPr lang="zh-TW" altLang="en-US" smtClean="0"/>
               <a:pPr/>
-              <a:t>2020/4/1</a:t>
+              <a:t>2020/6/28</a:t>
             </a:fld>
             <a:endParaRPr lang="zh-TW" altLang="en-US"/>
           </a:p>
@@ -3522,7 +3526,7 @@
             <a:fld id="{C389EDC9-19E3-47AC-9C57-C6A24DEA81AD}" type="datetime1">
               <a:rPr lang="zh-TW" altLang="en-US" smtClean="0"/>
               <a:pPr/>
-              <a:t>2020/4/1</a:t>
+              <a:t>2020/6/28</a:t>
             </a:fld>
             <a:endParaRPr lang="zh-TW" altLang="en-US"/>
           </a:p>
@@ -4120,7 +4124,7 @@
             <a:fld id="{A4F910E6-8D00-4BAF-8C48-9688E0B449D3}" type="datetime1">
               <a:rPr lang="zh-TW" altLang="en-US" smtClean="0"/>
               <a:pPr/>
-              <a:t>2020/4/1</a:t>
+              <a:t>2020/6/28</a:t>
             </a:fld>
             <a:endParaRPr lang="zh-TW" altLang="en-US"/>
           </a:p>
@@ -4451,7 +4455,7 @@
             <a:fld id="{A4F910E6-8D00-4BAF-8C48-9688E0B449D3}" type="datetime1">
               <a:rPr lang="zh-TW" altLang="en-US" smtClean="0"/>
               <a:pPr/>
-              <a:t>2020/4/1</a:t>
+              <a:t>2020/6/28</a:t>
             </a:fld>
             <a:endParaRPr lang="zh-TW" altLang="en-US"/>
           </a:p>
@@ -4842,32 +4846,9 @@
             <a:off x="0" y="2130425"/>
             <a:ext cx="9144000" cy="1470025"/>
           </a:xfrm>
-          <a:gradFill flip="none" rotWithShape="1">
-            <a:gsLst>
-              <a:gs pos="0">
-                <a:srgbClr val="00B0F0">
-                  <a:shade val="30000"/>
-                  <a:satMod val="115000"/>
-                </a:srgbClr>
-              </a:gs>
-              <a:gs pos="50000">
-                <a:srgbClr val="00B0F0">
-                  <a:shade val="67500"/>
-                  <a:satMod val="115000"/>
-                </a:srgbClr>
-              </a:gs>
-              <a:gs pos="100000">
-                <a:srgbClr val="00B0F0">
-                  <a:shade val="100000"/>
-                  <a:satMod val="115000"/>
-                </a:srgbClr>
-              </a:gs>
-            </a:gsLst>
-            <a:path path="circle">
-              <a:fillToRect t="100000" r="100000"/>
-            </a:path>
-            <a:tileRect l="-100000" b="-100000"/>
-          </a:gradFill>
+          <a:solidFill>
+            <a:srgbClr val="00B0F0"/>
+          </a:solidFill>
         </p:spPr>
         <p:txBody>
           <a:bodyPr>
@@ -4876,14 +4857,14 @@
           <a:lstStyle/>
           <a:p>
             <a:r>
-              <a:rPr lang="en-US" altLang="zh-TW" sz="6000" b="1" dirty="0">
+              <a:rPr lang="en-US" altLang="zh-TW" sz="4800" b="1" dirty="0">
                 <a:solidFill>
                   <a:srgbClr val="FFFF00"/>
                 </a:solidFill>
               </a:rPr>
-              <a:t>End of Chapter</a:t>
-            </a:r>
-            <a:endParaRPr lang="zh-TW" altLang="en-US" sz="6000" b="1" dirty="0">
+              <a:t>10.1 Quiz</a:t>
+            </a:r>
+            <a:endParaRPr lang="zh-TW" altLang="en-US" sz="4800" b="1" dirty="0">
               <a:solidFill>
                 <a:srgbClr val="FFFF00"/>
               </a:solidFill>
@@ -4906,10 +4887,10 @@
           <a:bodyPr/>
           <a:lstStyle/>
           <a:p>
-            <a:fld id="{4E46BE27-E923-4EC2-B046-3272AE2A3E5C}" type="datetime1">
+            <a:fld id="{C389EDC9-19E3-47AC-9C57-C6A24DEA81AD}" type="datetime1">
               <a:rPr lang="zh-TW" altLang="en-US" smtClean="0"/>
               <a:pPr/>
-              <a:t>2020/4/1</a:t>
+              <a:t>2020/6/28</a:t>
             </a:fld>
             <a:endParaRPr lang="zh-TW" altLang="en-US"/>
           </a:p>
@@ -4939,7 +4920,44 @@
           </a:p>
         </p:txBody>
       </p:sp>
+      <p:pic>
+        <p:nvPicPr>
+          <p:cNvPr id="2050" name="Picture 2"/>
+          <p:cNvPicPr>
+            <a:picLocks noChangeAspect="1" noChangeArrowheads="1"/>
+          </p:cNvPicPr>
+          <p:nvPr/>
+        </p:nvPicPr>
+        <p:blipFill>
+          <a:blip r:embed="rId2" cstate="print"/>
+          <a:srcRect/>
+          <a:stretch>
+            <a:fillRect/>
+          </a:stretch>
+        </p:blipFill>
+        <p:spPr bwMode="auto">
+          <a:xfrm>
+            <a:off x="4283968" y="3717032"/>
+            <a:ext cx="713805" cy="644588"/>
+          </a:xfrm>
+          <a:prstGeom prst="rect">
+            <a:avLst/>
+          </a:prstGeom>
+          <a:noFill/>
+          <a:ln w="9525">
+            <a:noFill/>
+            <a:miter lim="800000"/>
+            <a:headEnd/>
+            <a:tailEnd/>
+          </a:ln>
+        </p:spPr>
+      </p:pic>
     </p:spTree>
+    <p:extLst>
+      <p:ext uri="{BB962C8B-B14F-4D97-AF65-F5344CB8AC3E}">
+        <p14:creationId xmlns:p14="http://schemas.microsoft.com/office/powerpoint/2010/main" val="971380247"/>
+      </p:ext>
+    </p:extLst>
   </p:cSld>
   <p:clrMapOvr>
     <a:masterClrMapping/>
@@ -4947,7 +4965,7 @@
 </p:sld>
 </file>
 
-<file path=ppt/slides/slide2.xml><?xml version="1.0" encoding="utf-8"?>
+<file path=ppt/slides/slide13.xml><?xml version="1.0" encoding="utf-8"?>
 <p:sld xmlns:a="http://schemas.openxmlformats.org/drawingml/2006/main" xmlns:r="http://schemas.openxmlformats.org/officeDocument/2006/relationships" xmlns:p="http://schemas.openxmlformats.org/presentationml/2006/main">
   <p:cSld>
     <p:spTree>
@@ -5019,7 +5037,7 @@
                   <a:srgbClr val="FFFF00"/>
                 </a:solidFill>
               </a:rPr>
-              <a:t>10 State</a:t>
+              <a:t>10.1 Quiz</a:t>
             </a:r>
             <a:endParaRPr lang="zh-TW" altLang="en-US" b="1" dirty="0">
               <a:solidFill>
@@ -5041,8 +5059,8 @@
         </p:nvSpPr>
         <p:spPr>
           <a:xfrm>
-            <a:off x="467544" y="1340764"/>
-            <a:ext cx="8219256" cy="2202093"/>
+            <a:off x="323528" y="1380997"/>
+            <a:ext cx="8219256" cy="3344147"/>
           </a:xfrm>
           <a:ln>
             <a:solidFill>
@@ -5065,13 +5083,13 @@
               <a:buChar char="u"/>
             </a:pPr>
             <a:r>
-              <a:rPr lang="en-US" altLang="zh-TW" sz="1600" b="1" dirty="0">
-                <a:solidFill>
-                  <a:schemeClr val="tx1"/>
-                </a:solidFill>
-                <a:latin typeface="+mj-lt"/>
-              </a:rPr>
-              <a:t>Props vs. State:</a:t>
+              <a:rPr lang="en-US" altLang="zh-TW" sz="1800" b="1" dirty="0">
+                <a:solidFill>
+                  <a:schemeClr val="tx1"/>
+                </a:solidFill>
+                <a:latin typeface="+mj-lt"/>
+              </a:rPr>
+              <a:t>Quiz</a:t>
             </a:r>
           </a:p>
           <a:p>
@@ -5084,22 +5102,13 @@
               <a:buChar char="u"/>
             </a:pPr>
             <a:r>
-              <a:rPr lang="en-US" altLang="zh-TW" sz="1600" b="1" dirty="0">
-                <a:solidFill>
-                  <a:srgbClr val="C00000"/>
-                </a:solidFill>
-                <a:latin typeface="+mj-lt"/>
-              </a:rPr>
-              <a:t>Props get passed to the component and state is managed within the component</a:t>
-            </a:r>
-            <a:r>
-              <a:rPr lang="en-US" altLang="zh-TW" sz="1600" b="1" dirty="0">
-                <a:solidFill>
-                  <a:schemeClr val="tx1"/>
-                </a:solidFill>
-                <a:latin typeface="+mj-lt"/>
-              </a:rPr>
-              <a:t>. </a:t>
+              <a:rPr lang="en-US" altLang="zh-TW" sz="1800" dirty="0">
+                <a:solidFill>
+                  <a:schemeClr val="tx1"/>
+                </a:solidFill>
+                <a:latin typeface="+mj-lt"/>
+              </a:rPr>
+              <a:t>1. What is state?</a:t>
             </a:r>
           </a:p>
           <a:p>
@@ -5112,23 +5121,28 @@
               <a:buChar char="u"/>
             </a:pPr>
             <a:r>
-              <a:rPr lang="en-US" altLang="zh-TW" sz="1600" b="1" dirty="0">
-                <a:solidFill>
-                  <a:schemeClr val="tx1"/>
-                </a:solidFill>
-                <a:latin typeface="+mj-lt"/>
-              </a:rPr>
-              <a:t>Analogy for this would be </a:t>
-            </a:r>
-            <a:r>
-              <a:rPr lang="en-US" altLang="zh-TW" sz="1600" b="1" dirty="0">
-                <a:solidFill>
-                  <a:srgbClr val="C00000"/>
-                </a:solidFill>
-                <a:latin typeface="+mj-lt"/>
-              </a:rPr>
-              <a:t>function parameters against variables declared within the function body.</a:t>
-            </a:r>
+              <a:rPr lang="en-US" altLang="zh-TW" sz="1800" dirty="0">
+                <a:solidFill>
+                  <a:schemeClr val="tx1"/>
+                </a:solidFill>
+                <a:latin typeface="+mj-lt"/>
+              </a:rPr>
+              <a:t>Ans: </a:t>
+            </a:r>
+            <a:r>
+              <a:rPr lang="en-US" sz="1800" dirty="0">
+                <a:solidFill>
+                  <a:schemeClr val="tx1"/>
+                </a:solidFill>
+              </a:rPr>
+              <a:t>State is managed within the component</a:t>
+            </a:r>
+            <a:endParaRPr lang="en-US" altLang="zh-TW" sz="1800" dirty="0">
+              <a:solidFill>
+                <a:schemeClr val="tx1"/>
+              </a:solidFill>
+              <a:latin typeface="+mj-lt"/>
+            </a:endParaRPr>
           </a:p>
           <a:p>
             <a:pPr marL="342900" indent="-342900" algn="l">
@@ -5140,41 +5154,143 @@
               <a:buChar char="u"/>
             </a:pPr>
             <a:r>
-              <a:rPr lang="en-US" altLang="zh-TW" sz="1600" b="1" dirty="0">
-                <a:solidFill>
-                  <a:schemeClr val="tx1"/>
-                </a:solidFill>
-                <a:latin typeface="+mj-lt"/>
-              </a:rPr>
-              <a:t>Because a parent usually passes down the props to the child component, </a:t>
-            </a:r>
-            <a:r>
-              <a:rPr lang="en-US" altLang="zh-TW" sz="1600" b="1" dirty="0">
-                <a:solidFill>
-                  <a:srgbClr val="C00000"/>
-                </a:solidFill>
-                <a:latin typeface="+mj-lt"/>
-              </a:rPr>
-              <a:t>props are immutable</a:t>
-            </a:r>
-            <a:r>
-              <a:rPr lang="en-US" altLang="zh-TW" sz="1600" b="1" dirty="0">
-                <a:solidFill>
-                  <a:schemeClr val="tx1"/>
-                </a:solidFill>
-                <a:latin typeface="+mj-lt"/>
-              </a:rPr>
-              <a:t>. The parent owns the props and cannot be changed by the children. State, on the other hand, is managed within the component and hence, the component has </a:t>
-            </a:r>
-            <a:r>
-              <a:rPr lang="en-US" altLang="zh-TW" sz="1600" b="1" dirty="0">
-                <a:solidFill>
-                  <a:srgbClr val="C00000"/>
-                </a:solidFill>
-                <a:latin typeface="+mj-lt"/>
-              </a:rPr>
-              <a:t>fully controlled to change to change the state. </a:t>
-            </a:r>
+              <a:rPr lang="en-US" altLang="zh-TW" sz="1800" dirty="0">
+                <a:solidFill>
+                  <a:schemeClr val="tx1"/>
+                </a:solidFill>
+                <a:latin typeface="+mj-lt"/>
+              </a:rPr>
+              <a:t>2. What is difference of State and props?</a:t>
+            </a:r>
+          </a:p>
+          <a:p>
+            <a:pPr marL="342900" indent="-342900" algn="l">
+              <a:buClr>
+                <a:srgbClr val="0070C0"/>
+              </a:buClr>
+              <a:buSzPct val="80000"/>
+              <a:buFont typeface="Wingdings" pitchFamily="2" charset="2"/>
+              <a:buChar char="u"/>
+            </a:pPr>
+            <a:r>
+              <a:rPr lang="en-US" altLang="zh-TW" sz="1800" dirty="0">
+                <a:solidFill>
+                  <a:schemeClr val="tx1"/>
+                </a:solidFill>
+                <a:latin typeface="+mj-lt"/>
+              </a:rPr>
+              <a:t>Ans: </a:t>
+            </a:r>
+          </a:p>
+          <a:p>
+            <a:pPr marL="342900" indent="-342900" algn="l">
+              <a:buClr>
+                <a:srgbClr val="0070C0"/>
+              </a:buClr>
+              <a:buSzPct val="80000"/>
+              <a:buFont typeface="Wingdings" pitchFamily="2" charset="2"/>
+              <a:buChar char="u"/>
+            </a:pPr>
+            <a:r>
+              <a:rPr lang="en-US" altLang="zh-TW" sz="1800" dirty="0">
+                <a:solidFill>
+                  <a:schemeClr val="tx1"/>
+                </a:solidFill>
+                <a:latin typeface="+mj-lt"/>
+              </a:rPr>
+              <a:t>a) props is parameter passing and immutable</a:t>
+            </a:r>
+          </a:p>
+          <a:p>
+            <a:pPr marL="342900" indent="-342900" algn="l">
+              <a:buClr>
+                <a:srgbClr val="0070C0"/>
+              </a:buClr>
+              <a:buSzPct val="80000"/>
+              <a:buFont typeface="Wingdings" pitchFamily="2" charset="2"/>
+              <a:buChar char="u"/>
+            </a:pPr>
+            <a:r>
+              <a:rPr lang="en-US" altLang="zh-TW" sz="1800" dirty="0">
+                <a:solidFill>
+                  <a:schemeClr val="tx1"/>
+                </a:solidFill>
+                <a:latin typeface="+mj-lt"/>
+              </a:rPr>
+              <a:t>b) state is variable defined in class and mutable.</a:t>
+            </a:r>
+          </a:p>
+          <a:p>
+            <a:pPr marL="342900" indent="-342900" algn="l">
+              <a:buClr>
+                <a:srgbClr val="0070C0"/>
+              </a:buClr>
+              <a:buSzPct val="80000"/>
+              <a:buFont typeface="Wingdings" pitchFamily="2" charset="2"/>
+              <a:buChar char="u"/>
+            </a:pPr>
+            <a:r>
+              <a:rPr lang="en-US" altLang="zh-TW" sz="1800" dirty="0">
+                <a:solidFill>
+                  <a:schemeClr val="tx1"/>
+                </a:solidFill>
+                <a:latin typeface="+mj-lt"/>
+              </a:rPr>
+              <a:t>3. How to access props in functional and class components?</a:t>
+            </a:r>
+          </a:p>
+          <a:p>
+            <a:pPr marL="342900" indent="-342900" algn="l">
+              <a:buClr>
+                <a:srgbClr val="0070C0"/>
+              </a:buClr>
+              <a:buSzPct val="80000"/>
+              <a:buFont typeface="Wingdings" pitchFamily="2" charset="2"/>
+              <a:buChar char="u"/>
+            </a:pPr>
+            <a:r>
+              <a:rPr lang="en-US" altLang="zh-TW" sz="1800" dirty="0">
+                <a:solidFill>
+                  <a:schemeClr val="tx1"/>
+                </a:solidFill>
+                <a:latin typeface="+mj-lt"/>
+              </a:rPr>
+              <a:t>a) functional component: props</a:t>
+            </a:r>
+          </a:p>
+          <a:p>
+            <a:pPr marL="342900" indent="-342900" algn="l">
+              <a:buClr>
+                <a:srgbClr val="0070C0"/>
+              </a:buClr>
+              <a:buSzPct val="80000"/>
+              <a:buFont typeface="Wingdings" pitchFamily="2" charset="2"/>
+              <a:buChar char="u"/>
+            </a:pPr>
+            <a:r>
+              <a:rPr lang="en-US" altLang="zh-TW" sz="1800" dirty="0">
+                <a:solidFill>
+                  <a:schemeClr val="tx1"/>
+                </a:solidFill>
+                <a:latin typeface="+mj-lt"/>
+              </a:rPr>
+              <a:t>b) class component: </a:t>
+            </a:r>
+            <a:r>
+              <a:rPr lang="en-US" altLang="zh-TW" sz="1800" dirty="0" err="1">
+                <a:solidFill>
+                  <a:schemeClr val="tx1"/>
+                </a:solidFill>
+                <a:latin typeface="+mj-lt"/>
+              </a:rPr>
+              <a:t>this.props</a:t>
+            </a:r>
+            <a:endParaRPr lang="en-US" altLang="zh-TW" sz="1800" dirty="0">
+              <a:solidFill>
+                <a:schemeClr val="tx1"/>
+              </a:solidFill>
+              <a:latin typeface="+mj-lt"/>
+            </a:endParaRPr>
           </a:p>
         </p:txBody>
       </p:sp>
@@ -5260,7 +5376,7 @@
             <a:fld id="{A4F910E6-8D00-4BAF-8C48-9688E0B449D3}" type="datetime1">
               <a:rPr lang="zh-TW" altLang="en-US" smtClean="0"/>
               <a:pPr/>
-              <a:t>2020/4/1</a:t>
+              <a:t>2020/6/28</a:t>
             </a:fld>
             <a:endParaRPr lang="zh-TW" altLang="en-US"/>
           </a:p>
@@ -5289,377 +5405,18 @@
             <a:fld id="{E4D7E63D-91F2-4366-A2C4-1B00C9E2590E}" type="slidenum">
               <a:rPr lang="zh-TW" altLang="en-US" smtClean="0"/>
               <a:pPr/>
-              <a:t>2</a:t>
+              <a:t>13</a:t>
             </a:fld>
             <a:endParaRPr lang="zh-TW" altLang="en-US"/>
           </a:p>
         </p:txBody>
       </p:sp>
-      <p:sp>
-        <p:nvSpPr>
-          <p:cNvPr id="17" name="Rectangle 16">
-            <a:extLst>
-              <a:ext uri="{FF2B5EF4-FFF2-40B4-BE49-F238E27FC236}">
-                <a16:creationId xmlns:a16="http://schemas.microsoft.com/office/drawing/2014/main" id="{A4189769-6C59-4111-B31B-1E962B0C39C9}"/>
-              </a:ext>
-            </a:extLst>
-          </p:cNvPr>
-          <p:cNvSpPr/>
-          <p:nvPr/>
-        </p:nvSpPr>
-        <p:spPr>
-          <a:xfrm>
-            <a:off x="898612" y="4077072"/>
-            <a:ext cx="3384375" cy="2016224"/>
-          </a:xfrm>
-          <a:prstGeom prst="rect">
-            <a:avLst/>
-          </a:prstGeom>
-          <a:noFill/>
-        </p:spPr>
-        <p:style>
-          <a:lnRef idx="2">
-            <a:schemeClr val="accent1">
-              <a:shade val="50000"/>
-            </a:schemeClr>
-          </a:lnRef>
-          <a:fillRef idx="1">
-            <a:schemeClr val="accent1"/>
-          </a:fillRef>
-          <a:effectRef idx="0">
-            <a:schemeClr val="accent1"/>
-          </a:effectRef>
-          <a:fontRef idx="minor">
-            <a:schemeClr val="lt1"/>
-          </a:fontRef>
-        </p:style>
-        <p:txBody>
-          <a:bodyPr rtlCol="0" anchor="ctr"/>
-          <a:lstStyle/>
-          <a:p>
-            <a:r>
-              <a:rPr lang="en-US" sz="1400" dirty="0">
-                <a:solidFill>
-                  <a:schemeClr val="tx1"/>
-                </a:solidFill>
-              </a:rPr>
-              <a:t>Props get passed to the component</a:t>
-            </a:r>
-          </a:p>
-          <a:p>
-            <a:endParaRPr lang="en-US" sz="1400" dirty="0">
-              <a:solidFill>
-                <a:schemeClr val="tx1"/>
-              </a:solidFill>
-            </a:endParaRPr>
-          </a:p>
-          <a:p>
-            <a:r>
-              <a:rPr lang="en-US" sz="1400" dirty="0">
-                <a:solidFill>
-                  <a:schemeClr val="tx1"/>
-                </a:solidFill>
-              </a:rPr>
-              <a:t>Function parameters</a:t>
-            </a:r>
-          </a:p>
-          <a:p>
-            <a:endParaRPr lang="en-US" sz="1400" dirty="0">
-              <a:solidFill>
-                <a:schemeClr val="tx1"/>
-              </a:solidFill>
-            </a:endParaRPr>
-          </a:p>
-          <a:p>
-            <a:r>
-              <a:rPr lang="en-US" sz="1400" dirty="0">
-                <a:solidFill>
-                  <a:schemeClr val="tx1"/>
-                </a:solidFill>
-              </a:rPr>
-              <a:t>Props are immutable</a:t>
-            </a:r>
-          </a:p>
-          <a:p>
-            <a:endParaRPr lang="en-US" sz="1400" dirty="0">
-              <a:solidFill>
-                <a:schemeClr val="tx1"/>
-              </a:solidFill>
-            </a:endParaRPr>
-          </a:p>
-          <a:p>
-            <a:r>
-              <a:rPr lang="en-US" sz="1400" dirty="0">
-                <a:solidFill>
-                  <a:schemeClr val="tx1"/>
-                </a:solidFill>
-              </a:rPr>
-              <a:t>props – Functional Components</a:t>
-            </a:r>
-          </a:p>
-          <a:p>
-            <a:r>
-              <a:rPr lang="en-US" sz="1400" dirty="0" err="1">
-                <a:solidFill>
-                  <a:schemeClr val="tx1"/>
-                </a:solidFill>
-              </a:rPr>
-              <a:t>this.props</a:t>
-            </a:r>
-            <a:r>
-              <a:rPr lang="en-US" sz="1400" dirty="0">
-                <a:solidFill>
-                  <a:schemeClr val="tx1"/>
-                </a:solidFill>
-              </a:rPr>
-              <a:t> – Class Components</a:t>
-            </a:r>
-          </a:p>
-        </p:txBody>
-      </p:sp>
-      <p:sp>
-        <p:nvSpPr>
-          <p:cNvPr id="18" name="Rectangle 17">
-            <a:extLst>
-              <a:ext uri="{FF2B5EF4-FFF2-40B4-BE49-F238E27FC236}">
-                <a16:creationId xmlns:a16="http://schemas.microsoft.com/office/drawing/2014/main" id="{8003C4DA-3B32-4DC1-8D37-901E5749917D}"/>
-              </a:ext>
-            </a:extLst>
-          </p:cNvPr>
-          <p:cNvSpPr/>
-          <p:nvPr/>
-        </p:nvSpPr>
-        <p:spPr>
-          <a:xfrm>
-            <a:off x="826604" y="3771455"/>
-            <a:ext cx="1080120" cy="288032"/>
-          </a:xfrm>
-          <a:prstGeom prst="rect">
-            <a:avLst/>
-          </a:prstGeom>
-          <a:noFill/>
-          <a:ln>
-            <a:noFill/>
-          </a:ln>
-        </p:spPr>
-        <p:style>
-          <a:lnRef idx="2">
-            <a:schemeClr val="accent1">
-              <a:shade val="50000"/>
-            </a:schemeClr>
-          </a:lnRef>
-          <a:fillRef idx="1">
-            <a:schemeClr val="accent1"/>
-          </a:fillRef>
-          <a:effectRef idx="0">
-            <a:schemeClr val="accent1"/>
-          </a:effectRef>
-          <a:fontRef idx="minor">
-            <a:schemeClr val="lt1"/>
-          </a:fontRef>
-        </p:style>
-        <p:txBody>
-          <a:bodyPr rtlCol="0" anchor="ctr"/>
-          <a:lstStyle/>
-          <a:p>
-            <a:r>
-              <a:rPr lang="en-US" sz="1400" dirty="0">
-                <a:solidFill>
-                  <a:schemeClr val="tx1"/>
-                </a:solidFill>
-              </a:rPr>
-              <a:t>Props</a:t>
-            </a:r>
-          </a:p>
-        </p:txBody>
-      </p:sp>
-      <p:sp>
-        <p:nvSpPr>
-          <p:cNvPr id="19" name="Rectangle 18">
-            <a:extLst>
-              <a:ext uri="{FF2B5EF4-FFF2-40B4-BE49-F238E27FC236}">
-                <a16:creationId xmlns:a16="http://schemas.microsoft.com/office/drawing/2014/main" id="{CAA63A66-DB66-4FD5-A7C8-5D647E49275D}"/>
-              </a:ext>
-            </a:extLst>
-          </p:cNvPr>
-          <p:cNvSpPr/>
-          <p:nvPr/>
-        </p:nvSpPr>
-        <p:spPr>
-          <a:xfrm>
-            <a:off x="5147084" y="4081228"/>
-            <a:ext cx="3384376" cy="2016224"/>
-          </a:xfrm>
-          <a:prstGeom prst="rect">
-            <a:avLst/>
-          </a:prstGeom>
-          <a:noFill/>
-        </p:spPr>
-        <p:style>
-          <a:lnRef idx="2">
-            <a:schemeClr val="accent1">
-              <a:shade val="50000"/>
-            </a:schemeClr>
-          </a:lnRef>
-          <a:fillRef idx="1">
-            <a:schemeClr val="accent1"/>
-          </a:fillRef>
-          <a:effectRef idx="0">
-            <a:schemeClr val="accent1"/>
-          </a:effectRef>
-          <a:fontRef idx="minor">
-            <a:schemeClr val="lt1"/>
-          </a:fontRef>
-        </p:style>
-        <p:txBody>
-          <a:bodyPr rtlCol="0" anchor="ctr"/>
-          <a:lstStyle/>
-          <a:p>
-            <a:r>
-              <a:rPr lang="en-US" sz="1400" dirty="0">
-                <a:solidFill>
-                  <a:schemeClr val="tx1"/>
-                </a:solidFill>
-              </a:rPr>
-              <a:t>State is managed within the component</a:t>
-            </a:r>
-          </a:p>
-          <a:p>
-            <a:endParaRPr lang="en-US" sz="1400" dirty="0">
-              <a:solidFill>
-                <a:schemeClr val="tx1"/>
-              </a:solidFill>
-            </a:endParaRPr>
-          </a:p>
-          <a:p>
-            <a:r>
-              <a:rPr lang="en-US" sz="1400" dirty="0">
-                <a:solidFill>
-                  <a:schemeClr val="tx1"/>
-                </a:solidFill>
-              </a:rPr>
-              <a:t>Variables declared in the function body</a:t>
-            </a:r>
-          </a:p>
-          <a:p>
-            <a:endParaRPr lang="en-US" sz="1400" dirty="0">
-              <a:solidFill>
-                <a:schemeClr val="tx1"/>
-              </a:solidFill>
-            </a:endParaRPr>
-          </a:p>
-          <a:p>
-            <a:r>
-              <a:rPr lang="en-US" sz="1400" dirty="0">
-                <a:solidFill>
-                  <a:schemeClr val="tx1"/>
-                </a:solidFill>
-              </a:rPr>
-              <a:t>State can be changed</a:t>
-            </a:r>
-          </a:p>
-          <a:p>
-            <a:endParaRPr lang="en-US" sz="1400" dirty="0">
-              <a:solidFill>
-                <a:schemeClr val="tx1"/>
-              </a:solidFill>
-            </a:endParaRPr>
-          </a:p>
-          <a:p>
-            <a:r>
-              <a:rPr lang="en-US" sz="1400" dirty="0" err="1">
-                <a:solidFill>
-                  <a:schemeClr val="tx1"/>
-                </a:solidFill>
-              </a:rPr>
-              <a:t>useState</a:t>
-            </a:r>
-            <a:r>
-              <a:rPr lang="en-US" sz="1400" dirty="0">
-                <a:solidFill>
-                  <a:schemeClr val="tx1"/>
-                </a:solidFill>
-              </a:rPr>
-              <a:t> Hook – Functional Component</a:t>
-            </a:r>
-          </a:p>
-          <a:p>
-            <a:r>
-              <a:rPr lang="en-US" sz="1400" dirty="0" err="1">
-                <a:solidFill>
-                  <a:schemeClr val="tx1"/>
-                </a:solidFill>
-              </a:rPr>
-              <a:t>this.state</a:t>
-            </a:r>
-            <a:r>
-              <a:rPr lang="en-US" sz="1400" dirty="0">
-                <a:solidFill>
-                  <a:schemeClr val="tx1"/>
-                </a:solidFill>
-              </a:rPr>
-              <a:t> – Class Component.</a:t>
-            </a:r>
-          </a:p>
-        </p:txBody>
-      </p:sp>
-      <p:sp>
-        <p:nvSpPr>
-          <p:cNvPr id="20" name="Rectangle 19">
-            <a:extLst>
-              <a:ext uri="{FF2B5EF4-FFF2-40B4-BE49-F238E27FC236}">
-                <a16:creationId xmlns:a16="http://schemas.microsoft.com/office/drawing/2014/main" id="{2E709A9C-B9E3-4007-BDA9-353A281DDA1D}"/>
-              </a:ext>
-            </a:extLst>
-          </p:cNvPr>
-          <p:cNvSpPr/>
-          <p:nvPr/>
-        </p:nvSpPr>
-        <p:spPr>
-          <a:xfrm>
-            <a:off x="5116814" y="3810067"/>
-            <a:ext cx="1080120" cy="288032"/>
-          </a:xfrm>
-          <a:prstGeom prst="rect">
-            <a:avLst/>
-          </a:prstGeom>
-          <a:noFill/>
-          <a:ln>
-            <a:noFill/>
-          </a:ln>
-        </p:spPr>
-        <p:style>
-          <a:lnRef idx="2">
-            <a:schemeClr val="accent1">
-              <a:shade val="50000"/>
-            </a:schemeClr>
-          </a:lnRef>
-          <a:fillRef idx="1">
-            <a:schemeClr val="accent1"/>
-          </a:fillRef>
-          <a:effectRef idx="0">
-            <a:schemeClr val="accent1"/>
-          </a:effectRef>
-          <a:fontRef idx="minor">
-            <a:schemeClr val="lt1"/>
-          </a:fontRef>
-        </p:style>
-        <p:txBody>
-          <a:bodyPr rtlCol="0" anchor="ctr"/>
-          <a:lstStyle/>
-          <a:p>
-            <a:r>
-              <a:rPr lang="en-US" sz="1400" dirty="0">
-                <a:solidFill>
-                  <a:schemeClr val="tx1"/>
-                </a:solidFill>
-              </a:rPr>
-              <a:t>State</a:t>
-            </a:r>
-          </a:p>
-        </p:txBody>
-      </p:sp>
     </p:spTree>
+    <p:extLst>
+      <p:ext uri="{BB962C8B-B14F-4D97-AF65-F5344CB8AC3E}">
+        <p14:creationId xmlns:p14="http://schemas.microsoft.com/office/powerpoint/2010/main" val="145620147"/>
+      </p:ext>
+    </p:extLst>
   </p:cSld>
   <p:clrMapOvr>
     <a:masterClrMapping/>
@@ -5667,7 +5424,7 @@
 </p:sld>
 </file>
 
-<file path=ppt/slides/slide3.xml><?xml version="1.0" encoding="utf-8"?>
+<file path=ppt/slides/slide14.xml><?xml version="1.0" encoding="utf-8"?>
 <p:sld xmlns:a="http://schemas.openxmlformats.org/drawingml/2006/main" xmlns:r="http://schemas.openxmlformats.org/officeDocument/2006/relationships" xmlns:p="http://schemas.openxmlformats.org/presentationml/2006/main">
   <p:cSld>
     <p:spTree>
@@ -5739,7 +5496,7 @@
                   <a:srgbClr val="FFFF00"/>
                 </a:solidFill>
               </a:rPr>
-              <a:t>10 State</a:t>
+              <a:t>10.1 Quiz</a:t>
             </a:r>
             <a:endParaRPr lang="zh-TW" altLang="en-US" b="1" dirty="0">
               <a:solidFill>
@@ -5761,8 +5518,8 @@
         </p:nvSpPr>
         <p:spPr>
           <a:xfrm>
-            <a:off x="467544" y="1340764"/>
-            <a:ext cx="8219256" cy="2645072"/>
+            <a:off x="323528" y="1380996"/>
+            <a:ext cx="8219256" cy="4712300"/>
           </a:xfrm>
           <a:ln>
             <a:solidFill>
@@ -5785,13 +5542,13 @@
               <a:buChar char="u"/>
             </a:pPr>
             <a:r>
-              <a:rPr lang="en-US" altLang="zh-TW" sz="1600" b="1" dirty="0">
-                <a:solidFill>
-                  <a:schemeClr val="tx1"/>
-                </a:solidFill>
-                <a:latin typeface="+mj-lt"/>
-              </a:rPr>
-              <a:t>Props vs. State:</a:t>
+              <a:rPr lang="en-US" altLang="zh-TW" sz="1800" b="1" dirty="0">
+                <a:solidFill>
+                  <a:schemeClr val="tx1"/>
+                </a:solidFill>
+                <a:latin typeface="+mj-lt"/>
+              </a:rPr>
+              <a:t>Quiz</a:t>
             </a:r>
           </a:p>
           <a:p>
@@ -5804,31 +5561,13 @@
               <a:buChar char="u"/>
             </a:pPr>
             <a:r>
-              <a:rPr lang="en-US" altLang="zh-TW" sz="1600" b="1" dirty="0">
-                <a:solidFill>
-                  <a:schemeClr val="tx1"/>
-                </a:solidFill>
-                <a:latin typeface="+mj-lt"/>
-              </a:rPr>
-              <a:t>In the </a:t>
-            </a:r>
-            <a:r>
-              <a:rPr lang="en-US" altLang="zh-TW" sz="1600" b="1" dirty="0">
-                <a:solidFill>
-                  <a:srgbClr val="C00000"/>
-                </a:solidFill>
-                <a:latin typeface="+mj-lt"/>
-              </a:rPr>
-              <a:t>functional components, props can be accessed using the props parameter</a:t>
-            </a:r>
-            <a:r>
-              <a:rPr lang="en-US" altLang="zh-TW" sz="1600" b="1" dirty="0">
-                <a:solidFill>
-                  <a:schemeClr val="tx1"/>
-                </a:solidFill>
-                <a:latin typeface="+mj-lt"/>
-              </a:rPr>
-              <a:t>.</a:t>
+              <a:rPr lang="en-US" altLang="zh-TW" sz="1800" dirty="0">
+                <a:solidFill>
+                  <a:schemeClr val="tx1"/>
+                </a:solidFill>
+                <a:latin typeface="+mj-lt"/>
+              </a:rPr>
+              <a:t>3. How to access state in functional and class components?</a:t>
             </a:r>
           </a:p>
           <a:p>
@@ -5841,40 +5580,31 @@
               <a:buChar char="u"/>
             </a:pPr>
             <a:r>
-              <a:rPr lang="en-US" altLang="zh-TW" sz="1600" b="1" dirty="0">
-                <a:solidFill>
-                  <a:schemeClr val="tx1"/>
-                </a:solidFill>
-                <a:latin typeface="+mj-lt"/>
-              </a:rPr>
-              <a:t>In </a:t>
-            </a:r>
-            <a:r>
-              <a:rPr lang="en-US" altLang="zh-TW" sz="1600" b="1" dirty="0">
-                <a:solidFill>
-                  <a:srgbClr val="C00000"/>
-                </a:solidFill>
-                <a:latin typeface="+mj-lt"/>
-              </a:rPr>
-              <a:t>class components, props can be accessed using </a:t>
-            </a:r>
-            <a:r>
-              <a:rPr lang="en-US" altLang="zh-TW" sz="1600" b="1" dirty="0" err="1">
-                <a:solidFill>
-                  <a:srgbClr val="C00000"/>
-                </a:solidFill>
-                <a:latin typeface="+mj-lt"/>
-              </a:rPr>
-              <a:t>this.props</a:t>
-            </a:r>
-            <a:r>
-              <a:rPr lang="en-US" altLang="zh-TW" sz="1600" b="1" dirty="0">
-                <a:solidFill>
-                  <a:schemeClr val="tx1"/>
-                </a:solidFill>
-                <a:latin typeface="+mj-lt"/>
-              </a:rPr>
-              <a:t>.  </a:t>
+              <a:rPr lang="en-US" altLang="zh-TW" sz="1800" dirty="0">
+                <a:solidFill>
+                  <a:schemeClr val="tx1"/>
+                </a:solidFill>
+                <a:latin typeface="+mj-lt"/>
+              </a:rPr>
+              <a:t>a) functional component: </a:t>
+            </a:r>
+            <a:r>
+              <a:rPr lang="en-US" altLang="zh-TW" sz="1800" dirty="0" err="1">
+                <a:solidFill>
+                  <a:schemeClr val="tx1"/>
+                </a:solidFill>
+                <a:latin typeface="+mj-lt"/>
+              </a:rPr>
+              <a:t>useState</a:t>
+            </a:r>
+            <a:r>
+              <a:rPr lang="en-US" altLang="zh-TW" sz="1800" dirty="0">
+                <a:solidFill>
+                  <a:schemeClr val="tx1"/>
+                </a:solidFill>
+                <a:latin typeface="+mj-lt"/>
+              </a:rPr>
+              <a:t> Hook</a:t>
             </a:r>
           </a:p>
           <a:p>
@@ -5887,68 +5617,29 @@
               <a:buChar char="u"/>
             </a:pPr>
             <a:r>
-              <a:rPr lang="en-US" altLang="zh-TW" sz="1600" b="1" dirty="0">
-                <a:solidFill>
-                  <a:srgbClr val="C00000"/>
-                </a:solidFill>
-                <a:latin typeface="+mj-lt"/>
-              </a:rPr>
-              <a:t>State,</a:t>
-            </a:r>
-            <a:r>
-              <a:rPr lang="en-US" altLang="zh-TW" sz="1600" b="1" dirty="0">
-                <a:solidFill>
-                  <a:schemeClr val="tx1"/>
-                </a:solidFill>
-                <a:latin typeface="+mj-lt"/>
-              </a:rPr>
-              <a:t> on the other hand, can be accessed using </a:t>
-            </a:r>
-            <a:r>
-              <a:rPr lang="en-US" altLang="zh-TW" sz="1600" b="1" dirty="0" err="1">
-                <a:solidFill>
-                  <a:srgbClr val="C00000"/>
-                </a:solidFill>
-                <a:latin typeface="+mj-lt"/>
-              </a:rPr>
-              <a:t>useState</a:t>
-            </a:r>
-            <a:r>
-              <a:rPr lang="en-US" altLang="zh-TW" sz="1600" b="1" dirty="0">
-                <a:solidFill>
-                  <a:srgbClr val="C00000"/>
-                </a:solidFill>
-                <a:latin typeface="+mj-lt"/>
-              </a:rPr>
-              <a:t> Hook in functional component and </a:t>
-            </a:r>
-            <a:r>
-              <a:rPr lang="en-US" altLang="zh-TW" sz="1600" b="1" dirty="0" err="1">
-                <a:solidFill>
-                  <a:srgbClr val="C00000"/>
+              <a:rPr lang="en-US" altLang="zh-TW" sz="1800" dirty="0">
+                <a:solidFill>
+                  <a:schemeClr val="tx1"/>
+                </a:solidFill>
+                <a:latin typeface="+mj-lt"/>
+              </a:rPr>
+              <a:t>b) class component: </a:t>
+            </a:r>
+            <a:r>
+              <a:rPr lang="en-US" altLang="zh-TW" sz="1800" dirty="0" err="1">
+                <a:solidFill>
+                  <a:schemeClr val="tx1"/>
                 </a:solidFill>
                 <a:latin typeface="+mj-lt"/>
               </a:rPr>
               <a:t>this.state</a:t>
             </a:r>
-            <a:r>
-              <a:rPr lang="en-US" altLang="zh-TW" sz="1600" b="1" dirty="0">
-                <a:solidFill>
-                  <a:srgbClr val="C00000"/>
-                </a:solidFill>
-                <a:latin typeface="+mj-lt"/>
-              </a:rPr>
-              <a:t> in Class Component</a:t>
-            </a:r>
-            <a:r>
-              <a:rPr lang="en-US" altLang="zh-TW" sz="1600" b="1" dirty="0">
-                <a:solidFill>
-                  <a:schemeClr val="tx1"/>
-                </a:solidFill>
-                <a:latin typeface="+mj-lt"/>
-              </a:rPr>
-              <a:t>.</a:t>
-            </a:r>
+            <a:endParaRPr lang="en-US" altLang="zh-TW" sz="1800" dirty="0">
+              <a:solidFill>
+                <a:schemeClr val="tx1"/>
+              </a:solidFill>
+              <a:latin typeface="+mj-lt"/>
+            </a:endParaRPr>
           </a:p>
           <a:p>
             <a:pPr marL="342900" indent="-342900" algn="l">
@@ -5960,13 +5651,13 @@
               <a:buChar char="u"/>
             </a:pPr>
             <a:r>
-              <a:rPr lang="en-US" altLang="zh-TW" sz="1600" b="1" dirty="0">
-                <a:solidFill>
-                  <a:schemeClr val="tx1"/>
-                </a:solidFill>
-                <a:latin typeface="+mj-lt"/>
-              </a:rPr>
-              <a:t>Hook are a new feature in React. </a:t>
+              <a:rPr lang="en-US" altLang="zh-TW" sz="1800" dirty="0">
+                <a:solidFill>
+                  <a:schemeClr val="tx1"/>
+                </a:solidFill>
+                <a:latin typeface="+mj-lt"/>
+              </a:rPr>
+              <a:t>4. How to initialized state variable message to “Peter” in class Message?</a:t>
             </a:r>
           </a:p>
           <a:p>
@@ -5979,31 +5670,13 @@
               <a:buChar char="u"/>
             </a:pPr>
             <a:r>
-              <a:rPr lang="en-US" altLang="zh-TW" sz="1600" b="1" dirty="0">
-                <a:solidFill>
-                  <a:schemeClr val="tx1"/>
-                </a:solidFill>
-                <a:latin typeface="+mj-lt"/>
-              </a:rPr>
-              <a:t>When you start on existing projects at your work, you are more likely to encounter class components and the state object rather than the </a:t>
-            </a:r>
-            <a:r>
-              <a:rPr lang="en-US" altLang="zh-TW" sz="1600" b="1" dirty="0" err="1">
-                <a:solidFill>
-                  <a:schemeClr val="tx1"/>
-                </a:solidFill>
-                <a:latin typeface="+mj-lt"/>
-              </a:rPr>
-              <a:t>useState</a:t>
-            </a:r>
-            <a:r>
-              <a:rPr lang="en-US" altLang="zh-TW" sz="1600" b="1" dirty="0">
-                <a:solidFill>
-                  <a:schemeClr val="tx1"/>
-                </a:solidFill>
-                <a:latin typeface="+mj-lt"/>
-              </a:rPr>
-              <a:t> Hook. </a:t>
+              <a:rPr lang="en-US" altLang="zh-TW" sz="1800" dirty="0">
+                <a:solidFill>
+                  <a:schemeClr val="tx1"/>
+                </a:solidFill>
+                <a:latin typeface="+mj-lt"/>
+              </a:rPr>
+              <a:t>Ans:</a:t>
             </a:r>
           </a:p>
           <a:p>
@@ -6016,13 +5689,164 @@
               <a:buChar char="u"/>
             </a:pPr>
             <a:r>
-              <a:rPr lang="en-US" altLang="zh-TW" sz="1600" b="1" dirty="0">
-                <a:solidFill>
-                  <a:schemeClr val="tx1"/>
-                </a:solidFill>
-                <a:latin typeface="+mj-lt"/>
-              </a:rPr>
-              <a:t>Essentially, you have good understanding of the state in class components.</a:t>
+              <a:rPr lang="en-US" altLang="zh-TW" sz="1800" dirty="0">
+                <a:solidFill>
+                  <a:schemeClr val="tx1"/>
+                </a:solidFill>
+                <a:latin typeface="+mj-lt"/>
+              </a:rPr>
+              <a:t>class Message extends Component {</a:t>
+            </a:r>
+          </a:p>
+          <a:p>
+            <a:pPr marL="342900" indent="-342900" algn="l">
+              <a:buClr>
+                <a:srgbClr val="0070C0"/>
+              </a:buClr>
+              <a:buSzPct val="80000"/>
+              <a:buFont typeface="Wingdings" pitchFamily="2" charset="2"/>
+              <a:buChar char="u"/>
+            </a:pPr>
+            <a:r>
+              <a:rPr lang="en-US" altLang="zh-TW" sz="1800" dirty="0">
+                <a:solidFill>
+                  <a:schemeClr val="tx1"/>
+                </a:solidFill>
+                <a:latin typeface="+mj-lt"/>
+              </a:rPr>
+              <a:t>    constructor () {</a:t>
+            </a:r>
+          </a:p>
+          <a:p>
+            <a:pPr marL="342900" indent="-342900" algn="l">
+              <a:buClr>
+                <a:srgbClr val="0070C0"/>
+              </a:buClr>
+              <a:buSzPct val="80000"/>
+              <a:buFont typeface="Wingdings" pitchFamily="2" charset="2"/>
+              <a:buChar char="u"/>
+            </a:pPr>
+            <a:r>
+              <a:rPr lang="en-US" altLang="zh-TW" sz="1800" dirty="0">
+                <a:solidFill>
+                  <a:schemeClr val="tx1"/>
+                </a:solidFill>
+                <a:latin typeface="+mj-lt"/>
+              </a:rPr>
+              <a:t>        super()</a:t>
+            </a:r>
+          </a:p>
+          <a:p>
+            <a:pPr marL="342900" indent="-342900" algn="l">
+              <a:buClr>
+                <a:srgbClr val="0070C0"/>
+              </a:buClr>
+              <a:buSzPct val="80000"/>
+              <a:buFont typeface="Wingdings" pitchFamily="2" charset="2"/>
+              <a:buChar char="u"/>
+            </a:pPr>
+            <a:r>
+              <a:rPr lang="en-US" altLang="zh-TW" sz="1800" dirty="0">
+                <a:solidFill>
+                  <a:schemeClr val="tx1"/>
+                </a:solidFill>
+                <a:latin typeface="+mj-lt"/>
+              </a:rPr>
+              <a:t>        </a:t>
+            </a:r>
+            <a:r>
+              <a:rPr lang="en-US" altLang="zh-TW" sz="1800" dirty="0" err="1">
+                <a:solidFill>
+                  <a:schemeClr val="tx1"/>
+                </a:solidFill>
+                <a:latin typeface="+mj-lt"/>
+              </a:rPr>
+              <a:t>this.state</a:t>
+            </a:r>
+            <a:r>
+              <a:rPr lang="en-US" altLang="zh-TW" sz="1800" dirty="0">
+                <a:solidFill>
+                  <a:schemeClr val="tx1"/>
+                </a:solidFill>
+                <a:latin typeface="+mj-lt"/>
+              </a:rPr>
+              <a:t> = {</a:t>
+            </a:r>
+          </a:p>
+          <a:p>
+            <a:pPr marL="342900" indent="-342900" algn="l">
+              <a:buClr>
+                <a:srgbClr val="0070C0"/>
+              </a:buClr>
+              <a:buSzPct val="80000"/>
+              <a:buFont typeface="Wingdings" pitchFamily="2" charset="2"/>
+              <a:buChar char="u"/>
+            </a:pPr>
+            <a:r>
+              <a:rPr lang="en-US" altLang="zh-TW" sz="1800" dirty="0">
+                <a:solidFill>
+                  <a:schemeClr val="tx1"/>
+                </a:solidFill>
+                <a:latin typeface="+mj-lt"/>
+              </a:rPr>
+              <a:t>             message: “Peter”</a:t>
+            </a:r>
+          </a:p>
+          <a:p>
+            <a:pPr marL="342900" indent="-342900" algn="l">
+              <a:buClr>
+                <a:srgbClr val="0070C0"/>
+              </a:buClr>
+              <a:buSzPct val="80000"/>
+              <a:buFont typeface="Wingdings" pitchFamily="2" charset="2"/>
+              <a:buChar char="u"/>
+            </a:pPr>
+            <a:r>
+              <a:rPr lang="en-US" altLang="zh-TW" sz="1800" dirty="0">
+                <a:solidFill>
+                  <a:schemeClr val="tx1"/>
+                </a:solidFill>
+                <a:latin typeface="+mj-lt"/>
+              </a:rPr>
+              <a:t>        }</a:t>
+            </a:r>
+          </a:p>
+          <a:p>
+            <a:pPr marL="342900" indent="-342900" algn="l">
+              <a:buClr>
+                <a:srgbClr val="0070C0"/>
+              </a:buClr>
+              <a:buSzPct val="80000"/>
+              <a:buFont typeface="Wingdings" pitchFamily="2" charset="2"/>
+              <a:buChar char="u"/>
+            </a:pPr>
+            <a:r>
+              <a:rPr lang="en-US" altLang="zh-TW" sz="1800" dirty="0">
+                <a:solidFill>
+                  <a:schemeClr val="tx1"/>
+                </a:solidFill>
+                <a:latin typeface="+mj-lt"/>
+              </a:rPr>
+              <a:t>    }</a:t>
+            </a:r>
+          </a:p>
+          <a:p>
+            <a:pPr marL="342900" indent="-342900" algn="l">
+              <a:buClr>
+                <a:srgbClr val="0070C0"/>
+              </a:buClr>
+              <a:buSzPct val="80000"/>
+              <a:buFont typeface="Wingdings" pitchFamily="2" charset="2"/>
+              <a:buChar char="u"/>
+            </a:pPr>
+            <a:r>
+              <a:rPr lang="en-US" altLang="zh-TW" sz="1800" dirty="0">
+                <a:solidFill>
+                  <a:schemeClr val="tx1"/>
+                </a:solidFill>
+                <a:latin typeface="+mj-lt"/>
+              </a:rPr>
+              <a:t>}</a:t>
             </a:r>
           </a:p>
         </p:txBody>
@@ -6109,7 +5933,1858 @@
             <a:fld id="{A4F910E6-8D00-4BAF-8C48-9688E0B449D3}" type="datetime1">
               <a:rPr lang="zh-TW" altLang="en-US" smtClean="0"/>
               <a:pPr/>
-              <a:t>2020/4/1</a:t>
+              <a:t>2020/6/28</a:t>
+            </a:fld>
+            <a:endParaRPr lang="zh-TW" altLang="en-US"/>
+          </a:p>
+        </p:txBody>
+      </p:sp>
+      <p:sp>
+        <p:nvSpPr>
+          <p:cNvPr id="6" name="投影片編號版面配置區 5"/>
+          <p:cNvSpPr>
+            <a:spLocks noGrp="1"/>
+          </p:cNvSpPr>
+          <p:nvPr>
+            <p:ph type="sldNum" sz="quarter" idx="12"/>
+          </p:nvPr>
+        </p:nvSpPr>
+        <p:spPr>
+          <a:xfrm>
+            <a:off x="6553200" y="6356350"/>
+            <a:ext cx="2133600" cy="404246"/>
+          </a:xfrm>
+        </p:spPr>
+        <p:txBody>
+          <a:bodyPr/>
+          <a:lstStyle/>
+          <a:p>
+            <a:fld id="{E4D7E63D-91F2-4366-A2C4-1B00C9E2590E}" type="slidenum">
+              <a:rPr lang="zh-TW" altLang="en-US" smtClean="0"/>
+              <a:pPr/>
+              <a:t>14</a:t>
+            </a:fld>
+            <a:endParaRPr lang="zh-TW" altLang="en-US"/>
+          </a:p>
+        </p:txBody>
+      </p:sp>
+    </p:spTree>
+    <p:extLst>
+      <p:ext uri="{BB962C8B-B14F-4D97-AF65-F5344CB8AC3E}">
+        <p14:creationId xmlns:p14="http://schemas.microsoft.com/office/powerpoint/2010/main" val="1236811336"/>
+      </p:ext>
+    </p:extLst>
+  </p:cSld>
+  <p:clrMapOvr>
+    <a:masterClrMapping/>
+  </p:clrMapOvr>
+</p:sld>
+</file>
+
+<file path=ppt/slides/slide15.xml><?xml version="1.0" encoding="utf-8"?>
+<p:sld xmlns:a="http://schemas.openxmlformats.org/drawingml/2006/main" xmlns:r="http://schemas.openxmlformats.org/officeDocument/2006/relationships" xmlns:p="http://schemas.openxmlformats.org/presentationml/2006/main">
+  <p:cSld>
+    <p:spTree>
+      <p:nvGrpSpPr>
+        <p:cNvPr id="1" name=""/>
+        <p:cNvGrpSpPr/>
+        <p:nvPr/>
+      </p:nvGrpSpPr>
+      <p:grpSpPr>
+        <a:xfrm>
+          <a:off x="0" y="0"/>
+          <a:ext cx="0" cy="0"/>
+          <a:chOff x="0" y="0"/>
+          <a:chExt cx="0" cy="0"/>
+        </a:xfrm>
+      </p:grpSpPr>
+      <p:sp>
+        <p:nvSpPr>
+          <p:cNvPr id="2" name="標題 1"/>
+          <p:cNvSpPr>
+            <a:spLocks noGrp="1"/>
+          </p:cNvSpPr>
+          <p:nvPr>
+            <p:ph type="ctrTitle"/>
+          </p:nvPr>
+        </p:nvSpPr>
+        <p:spPr>
+          <a:xfrm>
+            <a:off x="0" y="1"/>
+            <a:ext cx="9144000" cy="764704"/>
+          </a:xfrm>
+          <a:gradFill flip="none" rotWithShape="1">
+            <a:gsLst>
+              <a:gs pos="0">
+                <a:srgbClr val="C00000">
+                  <a:shade val="30000"/>
+                  <a:satMod val="115000"/>
+                </a:srgbClr>
+              </a:gs>
+              <a:gs pos="50000">
+                <a:srgbClr val="C00000">
+                  <a:shade val="67500"/>
+                  <a:satMod val="115000"/>
+                </a:srgbClr>
+              </a:gs>
+              <a:gs pos="100000">
+                <a:srgbClr val="C00000">
+                  <a:shade val="100000"/>
+                  <a:satMod val="115000"/>
+                </a:srgbClr>
+              </a:gs>
+            </a:gsLst>
+            <a:path path="circle">
+              <a:fillToRect t="100000" r="100000"/>
+            </a:path>
+            <a:tileRect l="-100000" b="-100000"/>
+          </a:gradFill>
+        </p:spPr>
+        <p:txBody>
+          <a:bodyPr>
+            <a:normAutofit/>
+          </a:bodyPr>
+          <a:lstStyle/>
+          <a:p>
+            <a:pPr algn="l"/>
+            <a:r>
+              <a:rPr lang="en-US" altLang="zh-TW" b="1" dirty="0">
+                <a:solidFill>
+                  <a:srgbClr val="FFFF00"/>
+                </a:solidFill>
+              </a:rPr>
+              <a:t>10.1 Quiz</a:t>
+            </a:r>
+            <a:endParaRPr lang="zh-TW" altLang="en-US" b="1" dirty="0">
+              <a:solidFill>
+                <a:srgbClr val="FFFF00"/>
+              </a:solidFill>
+            </a:endParaRPr>
+          </a:p>
+        </p:txBody>
+      </p:sp>
+      <p:sp>
+        <p:nvSpPr>
+          <p:cNvPr id="3" name="副標題 2"/>
+          <p:cNvSpPr>
+            <a:spLocks noGrp="1"/>
+          </p:cNvSpPr>
+          <p:nvPr>
+            <p:ph type="subTitle" idx="1"/>
+          </p:nvPr>
+        </p:nvSpPr>
+        <p:spPr>
+          <a:xfrm>
+            <a:off x="323528" y="1380996"/>
+            <a:ext cx="8219256" cy="4064228"/>
+          </a:xfrm>
+          <a:ln>
+            <a:solidFill>
+              <a:srgbClr val="C00000"/>
+            </a:solidFill>
+          </a:ln>
+        </p:spPr>
+        <p:txBody>
+          <a:bodyPr>
+            <a:noAutofit/>
+          </a:bodyPr>
+          <a:lstStyle/>
+          <a:p>
+            <a:pPr marL="342900" indent="-342900" algn="l">
+              <a:buClr>
+                <a:srgbClr val="0070C0"/>
+              </a:buClr>
+              <a:buSzPct val="80000"/>
+              <a:buFont typeface="Wingdings" pitchFamily="2" charset="2"/>
+              <a:buChar char="u"/>
+            </a:pPr>
+            <a:r>
+              <a:rPr lang="en-US" altLang="zh-TW" sz="1800" b="1" dirty="0">
+                <a:solidFill>
+                  <a:schemeClr val="tx1"/>
+                </a:solidFill>
+                <a:latin typeface="+mj-lt"/>
+              </a:rPr>
+              <a:t>Quiz</a:t>
+            </a:r>
+          </a:p>
+          <a:p>
+            <a:pPr marL="342900" indent="-342900" algn="l">
+              <a:buClr>
+                <a:srgbClr val="0070C0"/>
+              </a:buClr>
+              <a:buSzPct val="80000"/>
+              <a:buFont typeface="Wingdings" pitchFamily="2" charset="2"/>
+              <a:buChar char="u"/>
+            </a:pPr>
+            <a:r>
+              <a:rPr lang="en-US" altLang="zh-TW" sz="1800" dirty="0">
+                <a:solidFill>
+                  <a:schemeClr val="tx1"/>
+                </a:solidFill>
+                <a:latin typeface="+mj-lt"/>
+              </a:rPr>
+              <a:t>5. How to render state variable message in &lt;h1&gt; element?</a:t>
+            </a:r>
+          </a:p>
+          <a:p>
+            <a:pPr marL="342900" indent="-342900" algn="l">
+              <a:buClr>
+                <a:srgbClr val="0070C0"/>
+              </a:buClr>
+              <a:buSzPct val="80000"/>
+              <a:buFont typeface="Wingdings" pitchFamily="2" charset="2"/>
+              <a:buChar char="u"/>
+            </a:pPr>
+            <a:r>
+              <a:rPr lang="en-US" altLang="zh-TW" sz="1800" dirty="0">
+                <a:solidFill>
+                  <a:schemeClr val="tx1"/>
+                </a:solidFill>
+                <a:latin typeface="+mj-lt"/>
+              </a:rPr>
+              <a:t>class Message extends Component {</a:t>
+            </a:r>
+          </a:p>
+          <a:p>
+            <a:pPr marL="342900" indent="-342900" algn="l">
+              <a:buClr>
+                <a:srgbClr val="0070C0"/>
+              </a:buClr>
+              <a:buSzPct val="80000"/>
+              <a:buFont typeface="Wingdings" pitchFamily="2" charset="2"/>
+              <a:buChar char="u"/>
+            </a:pPr>
+            <a:r>
+              <a:rPr lang="en-US" altLang="zh-TW" sz="1800" dirty="0">
+                <a:solidFill>
+                  <a:schemeClr val="tx1"/>
+                </a:solidFill>
+                <a:latin typeface="+mj-lt"/>
+              </a:rPr>
+              <a:t>    render () {</a:t>
+            </a:r>
+          </a:p>
+          <a:p>
+            <a:pPr marL="342900" indent="-342900" algn="l">
+              <a:buClr>
+                <a:srgbClr val="0070C0"/>
+              </a:buClr>
+              <a:buSzPct val="80000"/>
+              <a:buFont typeface="Wingdings" pitchFamily="2" charset="2"/>
+              <a:buChar char="u"/>
+            </a:pPr>
+            <a:r>
+              <a:rPr lang="en-US" altLang="zh-TW" sz="1800" dirty="0">
+                <a:solidFill>
+                  <a:schemeClr val="tx1"/>
+                </a:solidFill>
+                <a:latin typeface="+mj-lt"/>
+              </a:rPr>
+              <a:t>        console.log (</a:t>
+            </a:r>
+            <a:r>
+              <a:rPr lang="en-US" altLang="zh-TW" sz="1800" dirty="0" err="1">
+                <a:solidFill>
+                  <a:schemeClr val="tx1"/>
+                </a:solidFill>
+                <a:latin typeface="+mj-lt"/>
+              </a:rPr>
+              <a:t>this.state.message</a:t>
+            </a:r>
+            <a:r>
+              <a:rPr lang="en-US" altLang="zh-TW" sz="1800" dirty="0">
+                <a:solidFill>
+                  <a:schemeClr val="tx1"/>
+                </a:solidFill>
+                <a:latin typeface="+mj-lt"/>
+              </a:rPr>
+              <a:t>)</a:t>
+            </a:r>
+          </a:p>
+          <a:p>
+            <a:pPr marL="342900" indent="-342900" algn="l">
+              <a:buClr>
+                <a:srgbClr val="0070C0"/>
+              </a:buClr>
+              <a:buSzPct val="80000"/>
+              <a:buFont typeface="Wingdings" pitchFamily="2" charset="2"/>
+              <a:buChar char="u"/>
+            </a:pPr>
+            <a:r>
+              <a:rPr lang="en-US" altLang="zh-TW" sz="1800" dirty="0">
+                <a:solidFill>
+                  <a:schemeClr val="tx1"/>
+                </a:solidFill>
+                <a:latin typeface="+mj-lt"/>
+              </a:rPr>
+              <a:t>        return (</a:t>
+            </a:r>
+          </a:p>
+          <a:p>
+            <a:pPr marL="342900" indent="-342900" algn="l">
+              <a:buClr>
+                <a:srgbClr val="0070C0"/>
+              </a:buClr>
+              <a:buSzPct val="80000"/>
+              <a:buFont typeface="Wingdings" pitchFamily="2" charset="2"/>
+              <a:buChar char="u"/>
+            </a:pPr>
+            <a:r>
+              <a:rPr lang="en-US" altLang="zh-TW" sz="1800" dirty="0">
+                <a:solidFill>
+                  <a:schemeClr val="tx1"/>
+                </a:solidFill>
+                <a:latin typeface="+mj-lt"/>
+              </a:rPr>
+              <a:t>           &lt;div&gt;</a:t>
+            </a:r>
+          </a:p>
+          <a:p>
+            <a:pPr marL="342900" indent="-342900" algn="l">
+              <a:buClr>
+                <a:srgbClr val="0070C0"/>
+              </a:buClr>
+              <a:buSzPct val="80000"/>
+              <a:buFont typeface="Wingdings" pitchFamily="2" charset="2"/>
+              <a:buChar char="u"/>
+            </a:pPr>
+            <a:r>
+              <a:rPr lang="en-US" altLang="zh-TW" sz="1800" dirty="0">
+                <a:solidFill>
+                  <a:schemeClr val="tx1"/>
+                </a:solidFill>
+                <a:latin typeface="+mj-lt"/>
+              </a:rPr>
+              <a:t>                &lt;h1&gt; {</a:t>
+            </a:r>
+            <a:r>
+              <a:rPr lang="en-US" altLang="zh-TW" sz="1800" dirty="0" err="1">
+                <a:solidFill>
+                  <a:schemeClr val="tx1"/>
+                </a:solidFill>
+                <a:latin typeface="+mj-lt"/>
+              </a:rPr>
+              <a:t>this.state.message</a:t>
+            </a:r>
+            <a:r>
+              <a:rPr lang="en-US" altLang="zh-TW" sz="1800" dirty="0">
+                <a:solidFill>
+                  <a:schemeClr val="tx1"/>
+                </a:solidFill>
+                <a:latin typeface="+mj-lt"/>
+              </a:rPr>
+              <a:t>} &lt;/h1&gt;</a:t>
+            </a:r>
+          </a:p>
+          <a:p>
+            <a:pPr marL="342900" indent="-342900" algn="l">
+              <a:buClr>
+                <a:srgbClr val="0070C0"/>
+              </a:buClr>
+              <a:buSzPct val="80000"/>
+              <a:buFont typeface="Wingdings" pitchFamily="2" charset="2"/>
+              <a:buChar char="u"/>
+            </a:pPr>
+            <a:r>
+              <a:rPr lang="en-US" altLang="zh-TW" sz="1800" dirty="0">
+                <a:solidFill>
+                  <a:schemeClr val="tx1"/>
+                </a:solidFill>
+                <a:latin typeface="+mj-lt"/>
+              </a:rPr>
+              <a:t>          &lt;/div&gt;</a:t>
+            </a:r>
+          </a:p>
+          <a:p>
+            <a:pPr marL="342900" indent="-342900" algn="l">
+              <a:buClr>
+                <a:srgbClr val="0070C0"/>
+              </a:buClr>
+              <a:buSzPct val="80000"/>
+              <a:buFont typeface="Wingdings" pitchFamily="2" charset="2"/>
+              <a:buChar char="u"/>
+            </a:pPr>
+            <a:r>
+              <a:rPr lang="en-US" altLang="zh-TW" sz="1800" dirty="0">
+                <a:solidFill>
+                  <a:schemeClr val="tx1"/>
+                </a:solidFill>
+                <a:latin typeface="+mj-lt"/>
+              </a:rPr>
+              <a:t>        )</a:t>
+            </a:r>
+          </a:p>
+          <a:p>
+            <a:pPr marL="342900" indent="-342900" algn="l">
+              <a:buClr>
+                <a:srgbClr val="0070C0"/>
+              </a:buClr>
+              <a:buSzPct val="80000"/>
+              <a:buFont typeface="Wingdings" pitchFamily="2" charset="2"/>
+              <a:buChar char="u"/>
+            </a:pPr>
+            <a:r>
+              <a:rPr lang="en-US" altLang="zh-TW" sz="1800" dirty="0">
+                <a:solidFill>
+                  <a:schemeClr val="tx1"/>
+                </a:solidFill>
+                <a:latin typeface="+mj-lt"/>
+              </a:rPr>
+              <a:t>    }</a:t>
+            </a:r>
+          </a:p>
+          <a:p>
+            <a:pPr marL="342900" indent="-342900" algn="l">
+              <a:buClr>
+                <a:srgbClr val="0070C0"/>
+              </a:buClr>
+              <a:buSzPct val="80000"/>
+              <a:buFont typeface="Wingdings" pitchFamily="2" charset="2"/>
+              <a:buChar char="u"/>
+            </a:pPr>
+            <a:r>
+              <a:rPr lang="en-US" altLang="zh-TW" sz="1800" dirty="0">
+                <a:solidFill>
+                  <a:schemeClr val="tx1"/>
+                </a:solidFill>
+                <a:latin typeface="+mj-lt"/>
+              </a:rPr>
+              <a:t>}</a:t>
+            </a:r>
+          </a:p>
+        </p:txBody>
+      </p:sp>
+      <p:sp>
+        <p:nvSpPr>
+          <p:cNvPr id="4" name="標題 1"/>
+          <p:cNvSpPr txBox="1">
+            <a:spLocks/>
+          </p:cNvSpPr>
+          <p:nvPr/>
+        </p:nvSpPr>
+        <p:spPr>
+          <a:xfrm>
+            <a:off x="0" y="764704"/>
+            <a:ext cx="9144000" cy="398616"/>
+          </a:xfrm>
+          <a:prstGeom prst="rect">
+            <a:avLst/>
+          </a:prstGeom>
+          <a:gradFill flip="none" rotWithShape="1">
+            <a:gsLst>
+              <a:gs pos="0">
+                <a:srgbClr val="00B0F0">
+                  <a:shade val="30000"/>
+                  <a:satMod val="115000"/>
+                </a:srgbClr>
+              </a:gs>
+              <a:gs pos="50000">
+                <a:srgbClr val="00B0F0">
+                  <a:shade val="67500"/>
+                  <a:satMod val="115000"/>
+                </a:srgbClr>
+              </a:gs>
+              <a:gs pos="100000">
+                <a:srgbClr val="00B0F0">
+                  <a:shade val="100000"/>
+                  <a:satMod val="115000"/>
+                </a:srgbClr>
+              </a:gs>
+            </a:gsLst>
+            <a:path path="circle">
+              <a:fillToRect t="100000" r="100000"/>
+            </a:path>
+            <a:tileRect l="-100000" b="-100000"/>
+          </a:gradFill>
+        </p:spPr>
+        <p:txBody>
+          <a:bodyPr vert="horz" lIns="91440" tIns="45720" rIns="91440" bIns="45720" rtlCol="0" anchor="ctr">
+            <a:normAutofit fontScale="92500"/>
+          </a:bodyPr>
+          <a:lstStyle/>
+          <a:p>
+            <a:r>
+              <a:rPr lang="en-US" sz="1600" dirty="0">
+                <a:hlinkClick r:id="rId2"/>
+              </a:rPr>
+              <a:t>https://www.youtube.com/watch?v=4ORZ1GmjaMc&amp;list=PLC3y8-rFHvwgg3vaYJgHGnModB54rxOk3&amp;index=10</a:t>
+            </a:r>
+            <a:endParaRPr lang="en-US" altLang="zh-TW" sz="1600" b="1" i="1" dirty="0"/>
+          </a:p>
+        </p:txBody>
+      </p:sp>
+      <p:sp>
+        <p:nvSpPr>
+          <p:cNvPr id="5" name="日期版面配置區 4"/>
+          <p:cNvSpPr>
+            <a:spLocks noGrp="1"/>
+          </p:cNvSpPr>
+          <p:nvPr>
+            <p:ph type="dt" sz="half" idx="10"/>
+          </p:nvPr>
+        </p:nvSpPr>
+        <p:spPr>
+          <a:xfrm>
+            <a:off x="457200" y="6356350"/>
+            <a:ext cx="2133600" cy="404246"/>
+          </a:xfrm>
+        </p:spPr>
+        <p:txBody>
+          <a:bodyPr/>
+          <a:lstStyle/>
+          <a:p>
+            <a:fld id="{A4F910E6-8D00-4BAF-8C48-9688E0B449D3}" type="datetime1">
+              <a:rPr lang="zh-TW" altLang="en-US" smtClean="0"/>
+              <a:pPr/>
+              <a:t>2020/6/28</a:t>
+            </a:fld>
+            <a:endParaRPr lang="zh-TW" altLang="en-US"/>
+          </a:p>
+        </p:txBody>
+      </p:sp>
+      <p:sp>
+        <p:nvSpPr>
+          <p:cNvPr id="6" name="投影片編號版面配置區 5"/>
+          <p:cNvSpPr>
+            <a:spLocks noGrp="1"/>
+          </p:cNvSpPr>
+          <p:nvPr>
+            <p:ph type="sldNum" sz="quarter" idx="12"/>
+          </p:nvPr>
+        </p:nvSpPr>
+        <p:spPr>
+          <a:xfrm>
+            <a:off x="6553200" y="6356350"/>
+            <a:ext cx="2133600" cy="404246"/>
+          </a:xfrm>
+        </p:spPr>
+        <p:txBody>
+          <a:bodyPr/>
+          <a:lstStyle/>
+          <a:p>
+            <a:fld id="{E4D7E63D-91F2-4366-A2C4-1B00C9E2590E}" type="slidenum">
+              <a:rPr lang="zh-TW" altLang="en-US" smtClean="0"/>
+              <a:pPr/>
+              <a:t>15</a:t>
+            </a:fld>
+            <a:endParaRPr lang="zh-TW" altLang="en-US"/>
+          </a:p>
+        </p:txBody>
+      </p:sp>
+    </p:spTree>
+    <p:extLst>
+      <p:ext uri="{BB962C8B-B14F-4D97-AF65-F5344CB8AC3E}">
+        <p14:creationId xmlns:p14="http://schemas.microsoft.com/office/powerpoint/2010/main" val="2328155596"/>
+      </p:ext>
+    </p:extLst>
+  </p:cSld>
+  <p:clrMapOvr>
+    <a:masterClrMapping/>
+  </p:clrMapOvr>
+</p:sld>
+</file>
+
+<file path=ppt/slides/slide16.xml><?xml version="1.0" encoding="utf-8"?>
+<p:sld xmlns:a="http://schemas.openxmlformats.org/drawingml/2006/main" xmlns:r="http://schemas.openxmlformats.org/officeDocument/2006/relationships" xmlns:p="http://schemas.openxmlformats.org/presentationml/2006/main">
+  <p:cSld>
+    <p:spTree>
+      <p:nvGrpSpPr>
+        <p:cNvPr id="1" name=""/>
+        <p:cNvGrpSpPr/>
+        <p:nvPr/>
+      </p:nvGrpSpPr>
+      <p:grpSpPr>
+        <a:xfrm>
+          <a:off x="0" y="0"/>
+          <a:ext cx="0" cy="0"/>
+          <a:chOff x="0" y="0"/>
+          <a:chExt cx="0" cy="0"/>
+        </a:xfrm>
+      </p:grpSpPr>
+      <p:sp>
+        <p:nvSpPr>
+          <p:cNvPr id="2" name="標題 1"/>
+          <p:cNvSpPr>
+            <a:spLocks noGrp="1"/>
+          </p:cNvSpPr>
+          <p:nvPr>
+            <p:ph type="ctrTitle"/>
+          </p:nvPr>
+        </p:nvSpPr>
+        <p:spPr>
+          <a:xfrm>
+            <a:off x="0" y="2130425"/>
+            <a:ext cx="9144000" cy="1470025"/>
+          </a:xfrm>
+          <a:gradFill flip="none" rotWithShape="1">
+            <a:gsLst>
+              <a:gs pos="0">
+                <a:srgbClr val="00B0F0">
+                  <a:shade val="30000"/>
+                  <a:satMod val="115000"/>
+                </a:srgbClr>
+              </a:gs>
+              <a:gs pos="50000">
+                <a:srgbClr val="00B0F0">
+                  <a:shade val="67500"/>
+                  <a:satMod val="115000"/>
+                </a:srgbClr>
+              </a:gs>
+              <a:gs pos="100000">
+                <a:srgbClr val="00B0F0">
+                  <a:shade val="100000"/>
+                  <a:satMod val="115000"/>
+                </a:srgbClr>
+              </a:gs>
+            </a:gsLst>
+            <a:path path="circle">
+              <a:fillToRect t="100000" r="100000"/>
+            </a:path>
+            <a:tileRect l="-100000" b="-100000"/>
+          </a:gradFill>
+        </p:spPr>
+        <p:txBody>
+          <a:bodyPr>
+            <a:normAutofit/>
+          </a:bodyPr>
+          <a:lstStyle/>
+          <a:p>
+            <a:r>
+              <a:rPr lang="en-US" altLang="zh-TW" sz="6000" b="1" dirty="0">
+                <a:solidFill>
+                  <a:srgbClr val="FFFF00"/>
+                </a:solidFill>
+              </a:rPr>
+              <a:t>End of Chapter</a:t>
+            </a:r>
+            <a:endParaRPr lang="zh-TW" altLang="en-US" sz="6000" b="1" dirty="0">
+              <a:solidFill>
+                <a:srgbClr val="FFFF00"/>
+              </a:solidFill>
+            </a:endParaRPr>
+          </a:p>
+        </p:txBody>
+      </p:sp>
+      <p:sp>
+        <p:nvSpPr>
+          <p:cNvPr id="5" name="日期版面配置區 4"/>
+          <p:cNvSpPr>
+            <a:spLocks noGrp="1"/>
+          </p:cNvSpPr>
+          <p:nvPr>
+            <p:ph type="dt" sz="half" idx="10"/>
+          </p:nvPr>
+        </p:nvSpPr>
+        <p:spPr/>
+        <p:txBody>
+          <a:bodyPr/>
+          <a:lstStyle/>
+          <a:p>
+            <a:fld id="{4E46BE27-E923-4EC2-B046-3272AE2A3E5C}" type="datetime1">
+              <a:rPr lang="zh-TW" altLang="en-US" smtClean="0"/>
+              <a:pPr/>
+              <a:t>2020/6/28</a:t>
+            </a:fld>
+            <a:endParaRPr lang="zh-TW" altLang="en-US"/>
+          </a:p>
+        </p:txBody>
+      </p:sp>
+      <p:sp>
+        <p:nvSpPr>
+          <p:cNvPr id="6" name="投影片編號版面配置區 5"/>
+          <p:cNvSpPr>
+            <a:spLocks noGrp="1"/>
+          </p:cNvSpPr>
+          <p:nvPr>
+            <p:ph type="sldNum" sz="quarter" idx="12"/>
+          </p:nvPr>
+        </p:nvSpPr>
+        <p:spPr/>
+        <p:txBody>
+          <a:bodyPr/>
+          <a:lstStyle/>
+          <a:p>
+            <a:fld id="{E4D7E63D-91F2-4366-A2C4-1B00C9E2590E}" type="slidenum">
+              <a:rPr lang="zh-TW" altLang="en-US" smtClean="0"/>
+              <a:pPr/>
+              <a:t>16</a:t>
+            </a:fld>
+            <a:endParaRPr lang="zh-TW" altLang="en-US"/>
+          </a:p>
+        </p:txBody>
+      </p:sp>
+    </p:spTree>
+  </p:cSld>
+  <p:clrMapOvr>
+    <a:masterClrMapping/>
+  </p:clrMapOvr>
+</p:sld>
+</file>
+
+<file path=ppt/slides/slide2.xml><?xml version="1.0" encoding="utf-8"?>
+<p:sld xmlns:a="http://schemas.openxmlformats.org/drawingml/2006/main" xmlns:r="http://schemas.openxmlformats.org/officeDocument/2006/relationships" xmlns:p="http://schemas.openxmlformats.org/presentationml/2006/main">
+  <p:cSld>
+    <p:spTree>
+      <p:nvGrpSpPr>
+        <p:cNvPr id="1" name=""/>
+        <p:cNvGrpSpPr/>
+        <p:nvPr/>
+      </p:nvGrpSpPr>
+      <p:grpSpPr>
+        <a:xfrm>
+          <a:off x="0" y="0"/>
+          <a:ext cx="0" cy="0"/>
+          <a:chOff x="0" y="0"/>
+          <a:chExt cx="0" cy="0"/>
+        </a:xfrm>
+      </p:grpSpPr>
+      <p:sp>
+        <p:nvSpPr>
+          <p:cNvPr id="2" name="標題 1"/>
+          <p:cNvSpPr>
+            <a:spLocks noGrp="1"/>
+          </p:cNvSpPr>
+          <p:nvPr>
+            <p:ph type="ctrTitle"/>
+          </p:nvPr>
+        </p:nvSpPr>
+        <p:spPr>
+          <a:xfrm>
+            <a:off x="0" y="1"/>
+            <a:ext cx="9144000" cy="764704"/>
+          </a:xfrm>
+          <a:gradFill flip="none" rotWithShape="1">
+            <a:gsLst>
+              <a:gs pos="0">
+                <a:srgbClr val="C00000">
+                  <a:shade val="30000"/>
+                  <a:satMod val="115000"/>
+                </a:srgbClr>
+              </a:gs>
+              <a:gs pos="50000">
+                <a:srgbClr val="C00000">
+                  <a:shade val="67500"/>
+                  <a:satMod val="115000"/>
+                </a:srgbClr>
+              </a:gs>
+              <a:gs pos="100000">
+                <a:srgbClr val="C00000">
+                  <a:shade val="100000"/>
+                  <a:satMod val="115000"/>
+                </a:srgbClr>
+              </a:gs>
+            </a:gsLst>
+            <a:path path="circle">
+              <a:fillToRect t="100000" r="100000"/>
+            </a:path>
+            <a:tileRect l="-100000" b="-100000"/>
+          </a:gradFill>
+        </p:spPr>
+        <p:txBody>
+          <a:bodyPr>
+            <a:normAutofit/>
+          </a:bodyPr>
+          <a:lstStyle/>
+          <a:p>
+            <a:pPr algn="l"/>
+            <a:r>
+              <a:rPr lang="en-US" altLang="zh-TW" b="1" dirty="0">
+                <a:solidFill>
+                  <a:srgbClr val="FFFF00"/>
+                </a:solidFill>
+              </a:rPr>
+              <a:t>10 State</a:t>
+            </a:r>
+            <a:endParaRPr lang="zh-TW" altLang="en-US" b="1" dirty="0">
+              <a:solidFill>
+                <a:srgbClr val="FFFF00"/>
+              </a:solidFill>
+            </a:endParaRPr>
+          </a:p>
+        </p:txBody>
+      </p:sp>
+      <p:sp>
+        <p:nvSpPr>
+          <p:cNvPr id="3" name="副標題 2"/>
+          <p:cNvSpPr>
+            <a:spLocks noGrp="1"/>
+          </p:cNvSpPr>
+          <p:nvPr>
+            <p:ph type="subTitle" idx="1"/>
+          </p:nvPr>
+        </p:nvSpPr>
+        <p:spPr>
+          <a:xfrm>
+            <a:off x="467544" y="1340764"/>
+            <a:ext cx="8219256" cy="2202093"/>
+          </a:xfrm>
+          <a:ln>
+            <a:solidFill>
+              <a:srgbClr val="C00000"/>
+            </a:solidFill>
+          </a:ln>
+        </p:spPr>
+        <p:txBody>
+          <a:bodyPr>
+            <a:noAutofit/>
+          </a:bodyPr>
+          <a:lstStyle/>
+          <a:p>
+            <a:pPr marL="342900" indent="-342900" algn="l">
+              <a:buClr>
+                <a:srgbClr val="0070C0"/>
+              </a:buClr>
+              <a:buSzPct val="80000"/>
+              <a:buFont typeface="Wingdings" pitchFamily="2" charset="2"/>
+              <a:buChar char="u"/>
+            </a:pPr>
+            <a:r>
+              <a:rPr lang="en-US" altLang="zh-TW" sz="1600" b="1" dirty="0">
+                <a:solidFill>
+                  <a:schemeClr val="tx1"/>
+                </a:solidFill>
+                <a:latin typeface="+mj-lt"/>
+              </a:rPr>
+              <a:t>Props vs. State:</a:t>
+            </a:r>
+          </a:p>
+          <a:p>
+            <a:pPr marL="342900" indent="-342900" algn="l">
+              <a:buClr>
+                <a:srgbClr val="0070C0"/>
+              </a:buClr>
+              <a:buSzPct val="80000"/>
+              <a:buFont typeface="Wingdings" pitchFamily="2" charset="2"/>
+              <a:buChar char="u"/>
+            </a:pPr>
+            <a:r>
+              <a:rPr lang="en-US" altLang="zh-TW" sz="1600" b="1" dirty="0">
+                <a:solidFill>
+                  <a:srgbClr val="C00000"/>
+                </a:solidFill>
+                <a:latin typeface="+mj-lt"/>
+              </a:rPr>
+              <a:t>Props get passed to the component and state is managed within the component</a:t>
+            </a:r>
+            <a:r>
+              <a:rPr lang="en-US" altLang="zh-TW" sz="1600" b="1" dirty="0">
+                <a:solidFill>
+                  <a:schemeClr val="tx1"/>
+                </a:solidFill>
+                <a:latin typeface="+mj-lt"/>
+              </a:rPr>
+              <a:t>. </a:t>
+            </a:r>
+          </a:p>
+          <a:p>
+            <a:pPr marL="342900" indent="-342900" algn="l">
+              <a:buClr>
+                <a:srgbClr val="0070C0"/>
+              </a:buClr>
+              <a:buSzPct val="80000"/>
+              <a:buFont typeface="Wingdings" pitchFamily="2" charset="2"/>
+              <a:buChar char="u"/>
+            </a:pPr>
+            <a:r>
+              <a:rPr lang="en-US" altLang="zh-TW" sz="1600" b="1" dirty="0">
+                <a:solidFill>
+                  <a:schemeClr val="tx1"/>
+                </a:solidFill>
+                <a:latin typeface="+mj-lt"/>
+              </a:rPr>
+              <a:t>Analogy for this would be </a:t>
+            </a:r>
+            <a:r>
+              <a:rPr lang="en-US" altLang="zh-TW" sz="1600" b="1" dirty="0">
+                <a:solidFill>
+                  <a:srgbClr val="C00000"/>
+                </a:solidFill>
+                <a:latin typeface="+mj-lt"/>
+              </a:rPr>
+              <a:t>function parameters against variables declared within the function body.</a:t>
+            </a:r>
+          </a:p>
+          <a:p>
+            <a:pPr marL="342900" indent="-342900" algn="l">
+              <a:buClr>
+                <a:srgbClr val="0070C0"/>
+              </a:buClr>
+              <a:buSzPct val="80000"/>
+              <a:buFont typeface="Wingdings" pitchFamily="2" charset="2"/>
+              <a:buChar char="u"/>
+            </a:pPr>
+            <a:r>
+              <a:rPr lang="en-US" altLang="zh-TW" sz="1600" b="1" dirty="0">
+                <a:solidFill>
+                  <a:schemeClr val="tx1"/>
+                </a:solidFill>
+                <a:latin typeface="+mj-lt"/>
+              </a:rPr>
+              <a:t>Because a parent usually passes down the props to the child component, </a:t>
+            </a:r>
+            <a:r>
+              <a:rPr lang="en-US" altLang="zh-TW" sz="1600" b="1" dirty="0">
+                <a:solidFill>
+                  <a:srgbClr val="C00000"/>
+                </a:solidFill>
+                <a:latin typeface="+mj-lt"/>
+              </a:rPr>
+              <a:t>props are immutable</a:t>
+            </a:r>
+            <a:r>
+              <a:rPr lang="en-US" altLang="zh-TW" sz="1600" b="1" dirty="0">
+                <a:solidFill>
+                  <a:schemeClr val="tx1"/>
+                </a:solidFill>
+                <a:latin typeface="+mj-lt"/>
+              </a:rPr>
+              <a:t>. The parent owns the props and cannot be changed by the children. State, on the other hand, is managed within the component and hence, the component has </a:t>
+            </a:r>
+            <a:r>
+              <a:rPr lang="en-US" altLang="zh-TW" sz="1600" b="1" dirty="0">
+                <a:solidFill>
+                  <a:srgbClr val="C00000"/>
+                </a:solidFill>
+                <a:latin typeface="+mj-lt"/>
+              </a:rPr>
+              <a:t>fully controlled to change to change the state. </a:t>
+            </a:r>
+          </a:p>
+        </p:txBody>
+      </p:sp>
+      <p:sp>
+        <p:nvSpPr>
+          <p:cNvPr id="4" name="標題 1"/>
+          <p:cNvSpPr txBox="1">
+            <a:spLocks/>
+          </p:cNvSpPr>
+          <p:nvPr/>
+        </p:nvSpPr>
+        <p:spPr>
+          <a:xfrm>
+            <a:off x="0" y="764704"/>
+            <a:ext cx="9144000" cy="398616"/>
+          </a:xfrm>
+          <a:prstGeom prst="rect">
+            <a:avLst/>
+          </a:prstGeom>
+          <a:gradFill flip="none" rotWithShape="1">
+            <a:gsLst>
+              <a:gs pos="0">
+                <a:srgbClr val="00B0F0">
+                  <a:shade val="30000"/>
+                  <a:satMod val="115000"/>
+                </a:srgbClr>
+              </a:gs>
+              <a:gs pos="50000">
+                <a:srgbClr val="00B0F0">
+                  <a:shade val="67500"/>
+                  <a:satMod val="115000"/>
+                </a:srgbClr>
+              </a:gs>
+              <a:gs pos="100000">
+                <a:srgbClr val="00B0F0">
+                  <a:shade val="100000"/>
+                  <a:satMod val="115000"/>
+                </a:srgbClr>
+              </a:gs>
+            </a:gsLst>
+            <a:path path="circle">
+              <a:fillToRect t="100000" r="100000"/>
+            </a:path>
+            <a:tileRect l="-100000" b="-100000"/>
+          </a:gradFill>
+        </p:spPr>
+        <p:txBody>
+          <a:bodyPr vert="horz" lIns="91440" tIns="45720" rIns="91440" bIns="45720" rtlCol="0" anchor="ctr">
+            <a:normAutofit fontScale="92500"/>
+          </a:bodyPr>
+          <a:lstStyle/>
+          <a:p>
+            <a:r>
+              <a:rPr lang="en-US" sz="1600" dirty="0">
+                <a:hlinkClick r:id="rId2"/>
+              </a:rPr>
+              <a:t>https://www.youtube.com/watch?v=4ORZ1GmjaMc&amp;list=PLC3y8-rFHvwgg3vaYJgHGnModB54rxOk3&amp;index=10</a:t>
+            </a:r>
+            <a:endParaRPr lang="en-US" altLang="zh-TW" sz="1600" b="1" i="1" dirty="0"/>
+          </a:p>
+        </p:txBody>
+      </p:sp>
+      <p:sp>
+        <p:nvSpPr>
+          <p:cNvPr id="5" name="日期版面配置區 4"/>
+          <p:cNvSpPr>
+            <a:spLocks noGrp="1"/>
+          </p:cNvSpPr>
+          <p:nvPr>
+            <p:ph type="dt" sz="half" idx="10"/>
+          </p:nvPr>
+        </p:nvSpPr>
+        <p:spPr>
+          <a:xfrm>
+            <a:off x="457200" y="6356350"/>
+            <a:ext cx="2133600" cy="404246"/>
+          </a:xfrm>
+        </p:spPr>
+        <p:txBody>
+          <a:bodyPr/>
+          <a:lstStyle/>
+          <a:p>
+            <a:fld id="{A4F910E6-8D00-4BAF-8C48-9688E0B449D3}" type="datetime1">
+              <a:rPr lang="zh-TW" altLang="en-US" smtClean="0"/>
+              <a:pPr/>
+              <a:t>2020/6/28</a:t>
+            </a:fld>
+            <a:endParaRPr lang="zh-TW" altLang="en-US"/>
+          </a:p>
+        </p:txBody>
+      </p:sp>
+      <p:sp>
+        <p:nvSpPr>
+          <p:cNvPr id="6" name="投影片編號版面配置區 5"/>
+          <p:cNvSpPr>
+            <a:spLocks noGrp="1"/>
+          </p:cNvSpPr>
+          <p:nvPr>
+            <p:ph type="sldNum" sz="quarter" idx="12"/>
+          </p:nvPr>
+        </p:nvSpPr>
+        <p:spPr>
+          <a:xfrm>
+            <a:off x="6553200" y="6356350"/>
+            <a:ext cx="2133600" cy="404246"/>
+          </a:xfrm>
+        </p:spPr>
+        <p:txBody>
+          <a:bodyPr/>
+          <a:lstStyle/>
+          <a:p>
+            <a:fld id="{E4D7E63D-91F2-4366-A2C4-1B00C9E2590E}" type="slidenum">
+              <a:rPr lang="zh-TW" altLang="en-US" smtClean="0"/>
+              <a:pPr/>
+              <a:t>2</a:t>
+            </a:fld>
+            <a:endParaRPr lang="zh-TW" altLang="en-US"/>
+          </a:p>
+        </p:txBody>
+      </p:sp>
+      <p:sp>
+        <p:nvSpPr>
+          <p:cNvPr id="17" name="Rectangle 16">
+            <a:extLst>
+              <a:ext uri="{FF2B5EF4-FFF2-40B4-BE49-F238E27FC236}">
+                <a16:creationId xmlns:a16="http://schemas.microsoft.com/office/drawing/2014/main" id="{A4189769-6C59-4111-B31B-1E962B0C39C9}"/>
+              </a:ext>
+            </a:extLst>
+          </p:cNvPr>
+          <p:cNvSpPr/>
+          <p:nvPr/>
+        </p:nvSpPr>
+        <p:spPr>
+          <a:xfrm>
+            <a:off x="898612" y="4077072"/>
+            <a:ext cx="3384375" cy="2016224"/>
+          </a:xfrm>
+          <a:prstGeom prst="rect">
+            <a:avLst/>
+          </a:prstGeom>
+          <a:noFill/>
+        </p:spPr>
+        <p:style>
+          <a:lnRef idx="2">
+            <a:schemeClr val="accent1">
+              <a:shade val="50000"/>
+            </a:schemeClr>
+          </a:lnRef>
+          <a:fillRef idx="1">
+            <a:schemeClr val="accent1"/>
+          </a:fillRef>
+          <a:effectRef idx="0">
+            <a:schemeClr val="accent1"/>
+          </a:effectRef>
+          <a:fontRef idx="minor">
+            <a:schemeClr val="lt1"/>
+          </a:fontRef>
+        </p:style>
+        <p:txBody>
+          <a:bodyPr rtlCol="0" anchor="ctr"/>
+          <a:lstStyle/>
+          <a:p>
+            <a:r>
+              <a:rPr lang="en-US" sz="1400" dirty="0">
+                <a:solidFill>
+                  <a:schemeClr val="tx1"/>
+                </a:solidFill>
+              </a:rPr>
+              <a:t>Props get passed to the component</a:t>
+            </a:r>
+          </a:p>
+          <a:p>
+            <a:endParaRPr lang="en-US" sz="1400" dirty="0">
+              <a:solidFill>
+                <a:schemeClr val="tx1"/>
+              </a:solidFill>
+            </a:endParaRPr>
+          </a:p>
+          <a:p>
+            <a:r>
+              <a:rPr lang="en-US" sz="1400" dirty="0">
+                <a:solidFill>
+                  <a:schemeClr val="tx1"/>
+                </a:solidFill>
+              </a:rPr>
+              <a:t>Function parameters</a:t>
+            </a:r>
+          </a:p>
+          <a:p>
+            <a:endParaRPr lang="en-US" sz="1400" dirty="0">
+              <a:solidFill>
+                <a:schemeClr val="tx1"/>
+              </a:solidFill>
+            </a:endParaRPr>
+          </a:p>
+          <a:p>
+            <a:r>
+              <a:rPr lang="en-US" sz="1400" dirty="0">
+                <a:solidFill>
+                  <a:schemeClr val="tx1"/>
+                </a:solidFill>
+              </a:rPr>
+              <a:t>Props are immutable</a:t>
+            </a:r>
+          </a:p>
+          <a:p>
+            <a:endParaRPr lang="en-US" sz="1400" dirty="0">
+              <a:solidFill>
+                <a:schemeClr val="tx1"/>
+              </a:solidFill>
+            </a:endParaRPr>
+          </a:p>
+          <a:p>
+            <a:r>
+              <a:rPr lang="en-US" sz="1400" dirty="0">
+                <a:solidFill>
+                  <a:schemeClr val="tx1"/>
+                </a:solidFill>
+              </a:rPr>
+              <a:t>props – Functional Components</a:t>
+            </a:r>
+          </a:p>
+          <a:p>
+            <a:r>
+              <a:rPr lang="en-US" sz="1400" dirty="0" err="1">
+                <a:solidFill>
+                  <a:schemeClr val="tx1"/>
+                </a:solidFill>
+              </a:rPr>
+              <a:t>this.props</a:t>
+            </a:r>
+            <a:r>
+              <a:rPr lang="en-US" sz="1400" dirty="0">
+                <a:solidFill>
+                  <a:schemeClr val="tx1"/>
+                </a:solidFill>
+              </a:rPr>
+              <a:t> – Class Components</a:t>
+            </a:r>
+          </a:p>
+        </p:txBody>
+      </p:sp>
+      <p:sp>
+        <p:nvSpPr>
+          <p:cNvPr id="18" name="Rectangle 17">
+            <a:extLst>
+              <a:ext uri="{FF2B5EF4-FFF2-40B4-BE49-F238E27FC236}">
+                <a16:creationId xmlns:a16="http://schemas.microsoft.com/office/drawing/2014/main" id="{8003C4DA-3B32-4DC1-8D37-901E5749917D}"/>
+              </a:ext>
+            </a:extLst>
+          </p:cNvPr>
+          <p:cNvSpPr/>
+          <p:nvPr/>
+        </p:nvSpPr>
+        <p:spPr>
+          <a:xfrm>
+            <a:off x="826604" y="3771455"/>
+            <a:ext cx="1080120" cy="288032"/>
+          </a:xfrm>
+          <a:prstGeom prst="rect">
+            <a:avLst/>
+          </a:prstGeom>
+          <a:noFill/>
+          <a:ln>
+            <a:noFill/>
+          </a:ln>
+        </p:spPr>
+        <p:style>
+          <a:lnRef idx="2">
+            <a:schemeClr val="accent1">
+              <a:shade val="50000"/>
+            </a:schemeClr>
+          </a:lnRef>
+          <a:fillRef idx="1">
+            <a:schemeClr val="accent1"/>
+          </a:fillRef>
+          <a:effectRef idx="0">
+            <a:schemeClr val="accent1"/>
+          </a:effectRef>
+          <a:fontRef idx="minor">
+            <a:schemeClr val="lt1"/>
+          </a:fontRef>
+        </p:style>
+        <p:txBody>
+          <a:bodyPr rtlCol="0" anchor="ctr"/>
+          <a:lstStyle/>
+          <a:p>
+            <a:r>
+              <a:rPr lang="en-US" sz="1400" dirty="0">
+                <a:solidFill>
+                  <a:schemeClr val="tx1"/>
+                </a:solidFill>
+              </a:rPr>
+              <a:t>Props</a:t>
+            </a:r>
+          </a:p>
+        </p:txBody>
+      </p:sp>
+      <p:sp>
+        <p:nvSpPr>
+          <p:cNvPr id="19" name="Rectangle 18">
+            <a:extLst>
+              <a:ext uri="{FF2B5EF4-FFF2-40B4-BE49-F238E27FC236}">
+                <a16:creationId xmlns:a16="http://schemas.microsoft.com/office/drawing/2014/main" id="{CAA63A66-DB66-4FD5-A7C8-5D647E49275D}"/>
+              </a:ext>
+            </a:extLst>
+          </p:cNvPr>
+          <p:cNvSpPr/>
+          <p:nvPr/>
+        </p:nvSpPr>
+        <p:spPr>
+          <a:xfrm>
+            <a:off x="5147084" y="4081228"/>
+            <a:ext cx="3384376" cy="2016224"/>
+          </a:xfrm>
+          <a:prstGeom prst="rect">
+            <a:avLst/>
+          </a:prstGeom>
+          <a:noFill/>
+        </p:spPr>
+        <p:style>
+          <a:lnRef idx="2">
+            <a:schemeClr val="accent1">
+              <a:shade val="50000"/>
+            </a:schemeClr>
+          </a:lnRef>
+          <a:fillRef idx="1">
+            <a:schemeClr val="accent1"/>
+          </a:fillRef>
+          <a:effectRef idx="0">
+            <a:schemeClr val="accent1"/>
+          </a:effectRef>
+          <a:fontRef idx="minor">
+            <a:schemeClr val="lt1"/>
+          </a:fontRef>
+        </p:style>
+        <p:txBody>
+          <a:bodyPr rtlCol="0" anchor="ctr"/>
+          <a:lstStyle/>
+          <a:p>
+            <a:r>
+              <a:rPr lang="en-US" sz="1400" dirty="0">
+                <a:solidFill>
+                  <a:schemeClr val="tx1"/>
+                </a:solidFill>
+              </a:rPr>
+              <a:t>State is managed within the component</a:t>
+            </a:r>
+          </a:p>
+          <a:p>
+            <a:endParaRPr lang="en-US" sz="1400" dirty="0">
+              <a:solidFill>
+                <a:schemeClr val="tx1"/>
+              </a:solidFill>
+            </a:endParaRPr>
+          </a:p>
+          <a:p>
+            <a:r>
+              <a:rPr lang="en-US" sz="1400" dirty="0">
+                <a:solidFill>
+                  <a:schemeClr val="tx1"/>
+                </a:solidFill>
+              </a:rPr>
+              <a:t>Variables declared in the function body</a:t>
+            </a:r>
+          </a:p>
+          <a:p>
+            <a:endParaRPr lang="en-US" sz="1400" dirty="0">
+              <a:solidFill>
+                <a:schemeClr val="tx1"/>
+              </a:solidFill>
+            </a:endParaRPr>
+          </a:p>
+          <a:p>
+            <a:r>
+              <a:rPr lang="en-US" sz="1400" dirty="0">
+                <a:solidFill>
+                  <a:schemeClr val="tx1"/>
+                </a:solidFill>
+              </a:rPr>
+              <a:t>State can be changed</a:t>
+            </a:r>
+          </a:p>
+          <a:p>
+            <a:endParaRPr lang="en-US" sz="1400" dirty="0">
+              <a:solidFill>
+                <a:schemeClr val="tx1"/>
+              </a:solidFill>
+            </a:endParaRPr>
+          </a:p>
+          <a:p>
+            <a:r>
+              <a:rPr lang="en-US" sz="1400" dirty="0" err="1">
+                <a:solidFill>
+                  <a:schemeClr val="tx1"/>
+                </a:solidFill>
+              </a:rPr>
+              <a:t>useState</a:t>
+            </a:r>
+            <a:r>
+              <a:rPr lang="en-US" sz="1400" dirty="0">
+                <a:solidFill>
+                  <a:schemeClr val="tx1"/>
+                </a:solidFill>
+              </a:rPr>
+              <a:t> Hook – Functional Component</a:t>
+            </a:r>
+          </a:p>
+          <a:p>
+            <a:r>
+              <a:rPr lang="en-US" sz="1400" dirty="0" err="1">
+                <a:solidFill>
+                  <a:schemeClr val="tx1"/>
+                </a:solidFill>
+              </a:rPr>
+              <a:t>this.state</a:t>
+            </a:r>
+            <a:r>
+              <a:rPr lang="en-US" sz="1400" dirty="0">
+                <a:solidFill>
+                  <a:schemeClr val="tx1"/>
+                </a:solidFill>
+              </a:rPr>
+              <a:t> – Class Component.</a:t>
+            </a:r>
+          </a:p>
+        </p:txBody>
+      </p:sp>
+      <p:sp>
+        <p:nvSpPr>
+          <p:cNvPr id="20" name="Rectangle 19">
+            <a:extLst>
+              <a:ext uri="{FF2B5EF4-FFF2-40B4-BE49-F238E27FC236}">
+                <a16:creationId xmlns:a16="http://schemas.microsoft.com/office/drawing/2014/main" id="{2E709A9C-B9E3-4007-BDA9-353A281DDA1D}"/>
+              </a:ext>
+            </a:extLst>
+          </p:cNvPr>
+          <p:cNvSpPr/>
+          <p:nvPr/>
+        </p:nvSpPr>
+        <p:spPr>
+          <a:xfrm>
+            <a:off x="5116814" y="3810067"/>
+            <a:ext cx="1080120" cy="288032"/>
+          </a:xfrm>
+          <a:prstGeom prst="rect">
+            <a:avLst/>
+          </a:prstGeom>
+          <a:noFill/>
+          <a:ln>
+            <a:noFill/>
+          </a:ln>
+        </p:spPr>
+        <p:style>
+          <a:lnRef idx="2">
+            <a:schemeClr val="accent1">
+              <a:shade val="50000"/>
+            </a:schemeClr>
+          </a:lnRef>
+          <a:fillRef idx="1">
+            <a:schemeClr val="accent1"/>
+          </a:fillRef>
+          <a:effectRef idx="0">
+            <a:schemeClr val="accent1"/>
+          </a:effectRef>
+          <a:fontRef idx="minor">
+            <a:schemeClr val="lt1"/>
+          </a:fontRef>
+        </p:style>
+        <p:txBody>
+          <a:bodyPr rtlCol="0" anchor="ctr"/>
+          <a:lstStyle/>
+          <a:p>
+            <a:r>
+              <a:rPr lang="en-US" sz="1400" dirty="0">
+                <a:solidFill>
+                  <a:schemeClr val="tx1"/>
+                </a:solidFill>
+              </a:rPr>
+              <a:t>State</a:t>
+            </a:r>
+          </a:p>
+        </p:txBody>
+      </p:sp>
+    </p:spTree>
+  </p:cSld>
+  <p:clrMapOvr>
+    <a:masterClrMapping/>
+  </p:clrMapOvr>
+</p:sld>
+</file>
+
+<file path=ppt/slides/slide3.xml><?xml version="1.0" encoding="utf-8"?>
+<p:sld xmlns:a="http://schemas.openxmlformats.org/drawingml/2006/main" xmlns:r="http://schemas.openxmlformats.org/officeDocument/2006/relationships" xmlns:p="http://schemas.openxmlformats.org/presentationml/2006/main">
+  <p:cSld>
+    <p:spTree>
+      <p:nvGrpSpPr>
+        <p:cNvPr id="1" name=""/>
+        <p:cNvGrpSpPr/>
+        <p:nvPr/>
+      </p:nvGrpSpPr>
+      <p:grpSpPr>
+        <a:xfrm>
+          <a:off x="0" y="0"/>
+          <a:ext cx="0" cy="0"/>
+          <a:chOff x="0" y="0"/>
+          <a:chExt cx="0" cy="0"/>
+        </a:xfrm>
+      </p:grpSpPr>
+      <p:sp>
+        <p:nvSpPr>
+          <p:cNvPr id="2" name="標題 1"/>
+          <p:cNvSpPr>
+            <a:spLocks noGrp="1"/>
+          </p:cNvSpPr>
+          <p:nvPr>
+            <p:ph type="ctrTitle"/>
+          </p:nvPr>
+        </p:nvSpPr>
+        <p:spPr>
+          <a:xfrm>
+            <a:off x="0" y="1"/>
+            <a:ext cx="9144000" cy="764704"/>
+          </a:xfrm>
+          <a:gradFill flip="none" rotWithShape="1">
+            <a:gsLst>
+              <a:gs pos="0">
+                <a:srgbClr val="C00000">
+                  <a:shade val="30000"/>
+                  <a:satMod val="115000"/>
+                </a:srgbClr>
+              </a:gs>
+              <a:gs pos="50000">
+                <a:srgbClr val="C00000">
+                  <a:shade val="67500"/>
+                  <a:satMod val="115000"/>
+                </a:srgbClr>
+              </a:gs>
+              <a:gs pos="100000">
+                <a:srgbClr val="C00000">
+                  <a:shade val="100000"/>
+                  <a:satMod val="115000"/>
+                </a:srgbClr>
+              </a:gs>
+            </a:gsLst>
+            <a:path path="circle">
+              <a:fillToRect t="100000" r="100000"/>
+            </a:path>
+            <a:tileRect l="-100000" b="-100000"/>
+          </a:gradFill>
+        </p:spPr>
+        <p:txBody>
+          <a:bodyPr>
+            <a:normAutofit/>
+          </a:bodyPr>
+          <a:lstStyle/>
+          <a:p>
+            <a:pPr algn="l"/>
+            <a:r>
+              <a:rPr lang="en-US" altLang="zh-TW" b="1" dirty="0">
+                <a:solidFill>
+                  <a:srgbClr val="FFFF00"/>
+                </a:solidFill>
+              </a:rPr>
+              <a:t>10 State</a:t>
+            </a:r>
+            <a:endParaRPr lang="zh-TW" altLang="en-US" b="1" dirty="0">
+              <a:solidFill>
+                <a:srgbClr val="FFFF00"/>
+              </a:solidFill>
+            </a:endParaRPr>
+          </a:p>
+        </p:txBody>
+      </p:sp>
+      <p:sp>
+        <p:nvSpPr>
+          <p:cNvPr id="3" name="副標題 2"/>
+          <p:cNvSpPr>
+            <a:spLocks noGrp="1"/>
+          </p:cNvSpPr>
+          <p:nvPr>
+            <p:ph type="subTitle" idx="1"/>
+          </p:nvPr>
+        </p:nvSpPr>
+        <p:spPr>
+          <a:xfrm>
+            <a:off x="467544" y="1340764"/>
+            <a:ext cx="8219256" cy="2645072"/>
+          </a:xfrm>
+          <a:ln>
+            <a:solidFill>
+              <a:srgbClr val="C00000"/>
+            </a:solidFill>
+          </a:ln>
+        </p:spPr>
+        <p:txBody>
+          <a:bodyPr>
+            <a:noAutofit/>
+          </a:bodyPr>
+          <a:lstStyle/>
+          <a:p>
+            <a:pPr marL="342900" indent="-342900" algn="l">
+              <a:buClr>
+                <a:srgbClr val="0070C0"/>
+              </a:buClr>
+              <a:buSzPct val="80000"/>
+              <a:buFont typeface="Wingdings" pitchFamily="2" charset="2"/>
+              <a:buChar char="u"/>
+            </a:pPr>
+            <a:r>
+              <a:rPr lang="en-US" altLang="zh-TW" sz="1600" b="1" dirty="0">
+                <a:solidFill>
+                  <a:schemeClr val="tx1"/>
+                </a:solidFill>
+                <a:latin typeface="+mj-lt"/>
+              </a:rPr>
+              <a:t>Props vs. State:</a:t>
+            </a:r>
+          </a:p>
+          <a:p>
+            <a:pPr marL="342900" indent="-342900" algn="l">
+              <a:buClr>
+                <a:srgbClr val="0070C0"/>
+              </a:buClr>
+              <a:buSzPct val="80000"/>
+              <a:buFont typeface="Wingdings" pitchFamily="2" charset="2"/>
+              <a:buChar char="u"/>
+            </a:pPr>
+            <a:r>
+              <a:rPr lang="en-US" altLang="zh-TW" sz="1600" b="1" dirty="0">
+                <a:solidFill>
+                  <a:schemeClr val="tx1"/>
+                </a:solidFill>
+                <a:latin typeface="+mj-lt"/>
+              </a:rPr>
+              <a:t>In the </a:t>
+            </a:r>
+            <a:r>
+              <a:rPr lang="en-US" altLang="zh-TW" sz="1600" b="1" dirty="0">
+                <a:solidFill>
+                  <a:srgbClr val="C00000"/>
+                </a:solidFill>
+                <a:latin typeface="+mj-lt"/>
+              </a:rPr>
+              <a:t>functional components, props can be accessed using the props parameter</a:t>
+            </a:r>
+            <a:r>
+              <a:rPr lang="en-US" altLang="zh-TW" sz="1600" b="1" dirty="0">
+                <a:solidFill>
+                  <a:schemeClr val="tx1"/>
+                </a:solidFill>
+                <a:latin typeface="+mj-lt"/>
+              </a:rPr>
+              <a:t>.</a:t>
+            </a:r>
+          </a:p>
+          <a:p>
+            <a:pPr marL="342900" indent="-342900" algn="l">
+              <a:buClr>
+                <a:srgbClr val="0070C0"/>
+              </a:buClr>
+              <a:buSzPct val="80000"/>
+              <a:buFont typeface="Wingdings" pitchFamily="2" charset="2"/>
+              <a:buChar char="u"/>
+            </a:pPr>
+            <a:r>
+              <a:rPr lang="en-US" altLang="zh-TW" sz="1600" b="1" dirty="0">
+                <a:solidFill>
+                  <a:schemeClr val="tx1"/>
+                </a:solidFill>
+                <a:latin typeface="+mj-lt"/>
+              </a:rPr>
+              <a:t>In </a:t>
+            </a:r>
+            <a:r>
+              <a:rPr lang="en-US" altLang="zh-TW" sz="1600" b="1" dirty="0">
+                <a:solidFill>
+                  <a:srgbClr val="C00000"/>
+                </a:solidFill>
+                <a:latin typeface="+mj-lt"/>
+              </a:rPr>
+              <a:t>class components, props can be accessed using </a:t>
+            </a:r>
+            <a:r>
+              <a:rPr lang="en-US" altLang="zh-TW" sz="1600" b="1" dirty="0" err="1">
+                <a:solidFill>
+                  <a:srgbClr val="C00000"/>
+                </a:solidFill>
+                <a:latin typeface="+mj-lt"/>
+              </a:rPr>
+              <a:t>this.props</a:t>
+            </a:r>
+            <a:r>
+              <a:rPr lang="en-US" altLang="zh-TW" sz="1600" b="1" dirty="0">
+                <a:solidFill>
+                  <a:schemeClr val="tx1"/>
+                </a:solidFill>
+                <a:latin typeface="+mj-lt"/>
+              </a:rPr>
+              <a:t>.  </a:t>
+            </a:r>
+          </a:p>
+          <a:p>
+            <a:pPr marL="342900" indent="-342900" algn="l">
+              <a:buClr>
+                <a:srgbClr val="0070C0"/>
+              </a:buClr>
+              <a:buSzPct val="80000"/>
+              <a:buFont typeface="Wingdings" pitchFamily="2" charset="2"/>
+              <a:buChar char="u"/>
+            </a:pPr>
+            <a:r>
+              <a:rPr lang="en-US" altLang="zh-TW" sz="1600" b="1" dirty="0">
+                <a:solidFill>
+                  <a:srgbClr val="C00000"/>
+                </a:solidFill>
+                <a:latin typeface="+mj-lt"/>
+              </a:rPr>
+              <a:t>State,</a:t>
+            </a:r>
+            <a:r>
+              <a:rPr lang="en-US" altLang="zh-TW" sz="1600" b="1" dirty="0">
+                <a:solidFill>
+                  <a:schemeClr val="tx1"/>
+                </a:solidFill>
+                <a:latin typeface="+mj-lt"/>
+              </a:rPr>
+              <a:t> on the other hand, can be accessed using </a:t>
+            </a:r>
+            <a:r>
+              <a:rPr lang="en-US" altLang="zh-TW" sz="1600" b="1" dirty="0" err="1">
+                <a:solidFill>
+                  <a:srgbClr val="C00000"/>
+                </a:solidFill>
+                <a:latin typeface="+mj-lt"/>
+              </a:rPr>
+              <a:t>useState</a:t>
+            </a:r>
+            <a:r>
+              <a:rPr lang="en-US" altLang="zh-TW" sz="1600" b="1" dirty="0">
+                <a:solidFill>
+                  <a:srgbClr val="C00000"/>
+                </a:solidFill>
+                <a:latin typeface="+mj-lt"/>
+              </a:rPr>
+              <a:t> Hook in functional component and </a:t>
+            </a:r>
+            <a:r>
+              <a:rPr lang="en-US" altLang="zh-TW" sz="1600" b="1" dirty="0" err="1">
+                <a:solidFill>
+                  <a:srgbClr val="C00000"/>
+                </a:solidFill>
+                <a:latin typeface="+mj-lt"/>
+              </a:rPr>
+              <a:t>this.state</a:t>
+            </a:r>
+            <a:r>
+              <a:rPr lang="en-US" altLang="zh-TW" sz="1600" b="1" dirty="0">
+                <a:solidFill>
+                  <a:srgbClr val="C00000"/>
+                </a:solidFill>
+                <a:latin typeface="+mj-lt"/>
+              </a:rPr>
+              <a:t> in Class Component</a:t>
+            </a:r>
+            <a:r>
+              <a:rPr lang="en-US" altLang="zh-TW" sz="1600" b="1" dirty="0">
+                <a:solidFill>
+                  <a:schemeClr val="tx1"/>
+                </a:solidFill>
+                <a:latin typeface="+mj-lt"/>
+              </a:rPr>
+              <a:t>.</a:t>
+            </a:r>
+          </a:p>
+          <a:p>
+            <a:pPr marL="342900" indent="-342900" algn="l">
+              <a:buClr>
+                <a:srgbClr val="0070C0"/>
+              </a:buClr>
+              <a:buSzPct val="80000"/>
+              <a:buFont typeface="Wingdings" pitchFamily="2" charset="2"/>
+              <a:buChar char="u"/>
+            </a:pPr>
+            <a:r>
+              <a:rPr lang="en-US" altLang="zh-TW" sz="1600" b="1" dirty="0">
+                <a:solidFill>
+                  <a:schemeClr val="tx1"/>
+                </a:solidFill>
+                <a:latin typeface="+mj-lt"/>
+              </a:rPr>
+              <a:t>Hook are a new feature in React. </a:t>
+            </a:r>
+          </a:p>
+          <a:p>
+            <a:pPr marL="342900" indent="-342900" algn="l">
+              <a:buClr>
+                <a:srgbClr val="0070C0"/>
+              </a:buClr>
+              <a:buSzPct val="80000"/>
+              <a:buFont typeface="Wingdings" pitchFamily="2" charset="2"/>
+              <a:buChar char="u"/>
+            </a:pPr>
+            <a:r>
+              <a:rPr lang="en-US" altLang="zh-TW" sz="1600" b="1" dirty="0">
+                <a:solidFill>
+                  <a:schemeClr val="tx1"/>
+                </a:solidFill>
+                <a:latin typeface="+mj-lt"/>
+              </a:rPr>
+              <a:t>When you start on existing projects at your work, you are more likely to encounter class components and the state object rather than the </a:t>
+            </a:r>
+            <a:r>
+              <a:rPr lang="en-US" altLang="zh-TW" sz="1600" b="1" dirty="0" err="1">
+                <a:solidFill>
+                  <a:schemeClr val="tx1"/>
+                </a:solidFill>
+                <a:latin typeface="+mj-lt"/>
+              </a:rPr>
+              <a:t>useState</a:t>
+            </a:r>
+            <a:r>
+              <a:rPr lang="en-US" altLang="zh-TW" sz="1600" b="1" dirty="0">
+                <a:solidFill>
+                  <a:schemeClr val="tx1"/>
+                </a:solidFill>
+                <a:latin typeface="+mj-lt"/>
+              </a:rPr>
+              <a:t> Hook. </a:t>
+            </a:r>
+          </a:p>
+          <a:p>
+            <a:pPr marL="342900" indent="-342900" algn="l">
+              <a:buClr>
+                <a:srgbClr val="0070C0"/>
+              </a:buClr>
+              <a:buSzPct val="80000"/>
+              <a:buFont typeface="Wingdings" pitchFamily="2" charset="2"/>
+              <a:buChar char="u"/>
+            </a:pPr>
+            <a:r>
+              <a:rPr lang="en-US" altLang="zh-TW" sz="1600" b="1" dirty="0">
+                <a:solidFill>
+                  <a:schemeClr val="tx1"/>
+                </a:solidFill>
+                <a:latin typeface="+mj-lt"/>
+              </a:rPr>
+              <a:t>Essentially, you have good understanding of the state in class components.</a:t>
+            </a:r>
+          </a:p>
+        </p:txBody>
+      </p:sp>
+      <p:sp>
+        <p:nvSpPr>
+          <p:cNvPr id="4" name="標題 1"/>
+          <p:cNvSpPr txBox="1">
+            <a:spLocks/>
+          </p:cNvSpPr>
+          <p:nvPr/>
+        </p:nvSpPr>
+        <p:spPr>
+          <a:xfrm>
+            <a:off x="0" y="764704"/>
+            <a:ext cx="9144000" cy="398616"/>
+          </a:xfrm>
+          <a:prstGeom prst="rect">
+            <a:avLst/>
+          </a:prstGeom>
+          <a:gradFill flip="none" rotWithShape="1">
+            <a:gsLst>
+              <a:gs pos="0">
+                <a:srgbClr val="00B0F0">
+                  <a:shade val="30000"/>
+                  <a:satMod val="115000"/>
+                </a:srgbClr>
+              </a:gs>
+              <a:gs pos="50000">
+                <a:srgbClr val="00B0F0">
+                  <a:shade val="67500"/>
+                  <a:satMod val="115000"/>
+                </a:srgbClr>
+              </a:gs>
+              <a:gs pos="100000">
+                <a:srgbClr val="00B0F0">
+                  <a:shade val="100000"/>
+                  <a:satMod val="115000"/>
+                </a:srgbClr>
+              </a:gs>
+            </a:gsLst>
+            <a:path path="circle">
+              <a:fillToRect t="100000" r="100000"/>
+            </a:path>
+            <a:tileRect l="-100000" b="-100000"/>
+          </a:gradFill>
+        </p:spPr>
+        <p:txBody>
+          <a:bodyPr vert="horz" lIns="91440" tIns="45720" rIns="91440" bIns="45720" rtlCol="0" anchor="ctr">
+            <a:normAutofit fontScale="92500"/>
+          </a:bodyPr>
+          <a:lstStyle/>
+          <a:p>
+            <a:r>
+              <a:rPr lang="en-US" sz="1600" dirty="0">
+                <a:hlinkClick r:id="rId2"/>
+              </a:rPr>
+              <a:t>https://www.youtube.com/watch?v=4ORZ1GmjaMc&amp;list=PLC3y8-rFHvwgg3vaYJgHGnModB54rxOk3&amp;index=10</a:t>
+            </a:r>
+            <a:endParaRPr lang="en-US" altLang="zh-TW" sz="1600" b="1" i="1" dirty="0"/>
+          </a:p>
+        </p:txBody>
+      </p:sp>
+      <p:sp>
+        <p:nvSpPr>
+          <p:cNvPr id="5" name="日期版面配置區 4"/>
+          <p:cNvSpPr>
+            <a:spLocks noGrp="1"/>
+          </p:cNvSpPr>
+          <p:nvPr>
+            <p:ph type="dt" sz="half" idx="10"/>
+          </p:nvPr>
+        </p:nvSpPr>
+        <p:spPr>
+          <a:xfrm>
+            <a:off x="457200" y="6356350"/>
+            <a:ext cx="2133600" cy="404246"/>
+          </a:xfrm>
+        </p:spPr>
+        <p:txBody>
+          <a:bodyPr/>
+          <a:lstStyle/>
+          <a:p>
+            <a:fld id="{A4F910E6-8D00-4BAF-8C48-9688E0B449D3}" type="datetime1">
+              <a:rPr lang="zh-TW" altLang="en-US" smtClean="0"/>
+              <a:pPr/>
+              <a:t>2020/6/28</a:t>
             </a:fld>
             <a:endParaRPr lang="zh-TW" altLang="en-US"/>
           </a:p>
@@ -6807,7 +8482,7 @@
             <a:fld id="{A4F910E6-8D00-4BAF-8C48-9688E0B449D3}" type="datetime1">
               <a:rPr lang="zh-TW" altLang="en-US" smtClean="0"/>
               <a:pPr/>
-              <a:t>2020/4/1</a:t>
+              <a:t>2020/6/28</a:t>
             </a:fld>
             <a:endParaRPr lang="zh-TW" altLang="en-US"/>
           </a:p>
@@ -7468,7 +9143,7 @@
             <a:fld id="{A4F910E6-8D00-4BAF-8C48-9688E0B449D3}" type="datetime1">
               <a:rPr lang="zh-TW" altLang="en-US" smtClean="0"/>
               <a:pPr/>
-              <a:t>2020/4/1</a:t>
+              <a:t>2020/6/28</a:t>
             </a:fld>
             <a:endParaRPr lang="zh-TW" altLang="en-US"/>
           </a:p>
@@ -7850,7 +9525,7 @@
             <a:fld id="{A4F910E6-8D00-4BAF-8C48-9688E0B449D3}" type="datetime1">
               <a:rPr lang="zh-TW" altLang="en-US" smtClean="0"/>
               <a:pPr/>
-              <a:t>2020/4/1</a:t>
+              <a:t>2020/6/28</a:t>
             </a:fld>
             <a:endParaRPr lang="zh-TW" altLang="en-US"/>
           </a:p>
@@ -8275,7 +9950,7 @@
             <a:fld id="{A4F910E6-8D00-4BAF-8C48-9688E0B449D3}" type="datetime1">
               <a:rPr lang="zh-TW" altLang="en-US" smtClean="0"/>
               <a:pPr/>
-              <a:t>2020/4/1</a:t>
+              <a:t>2020/6/28</a:t>
             </a:fld>
             <a:endParaRPr lang="zh-TW" altLang="en-US"/>
           </a:p>
@@ -8678,7 +10353,7 @@
             <a:fld id="{A4F910E6-8D00-4BAF-8C48-9688E0B449D3}" type="datetime1">
               <a:rPr lang="zh-TW" altLang="en-US" smtClean="0"/>
               <a:pPr/>
-              <a:t>2020/4/1</a:t>
+              <a:t>2020/6/28</a:t>
             </a:fld>
             <a:endParaRPr lang="zh-TW" altLang="en-US"/>
           </a:p>
@@ -9012,7 +10687,7 @@
             <a:fld id="{A4F910E6-8D00-4BAF-8C48-9688E0B449D3}" type="datetime1">
               <a:rPr lang="zh-TW" altLang="en-US" smtClean="0"/>
               <a:pPr/>
-              <a:t>2020/4/1</a:t>
+              <a:t>2020/6/28</a:t>
             </a:fld>
             <a:endParaRPr lang="zh-TW" altLang="en-US"/>
           </a:p>

</xml_diff>